<commit_message>
updated notes in some slides
</commit_message>
<xml_diff>
--- a/Slides/Module 03 Code-Level Design Principles.pptx
+++ b/Slides/Module 03 Code-Level Design Principles.pptx
@@ -875,30 +875,6 @@
     </pc:docChg>
   </pc:docChgLst>
   <pc:docChgLst>
-    <pc:chgData name="Mitchell Wand" userId="de9b44c55c049659" providerId="LiveId" clId="{2F0674E9-A568-49F0-A150-6793737DAAAA}"/>
-    <pc:docChg chg="modSld">
-      <pc:chgData name="Mitchell Wand" userId="de9b44c55c049659" providerId="LiveId" clId="{2F0674E9-A568-49F0-A150-6793737DAAAA}" dt="2022-09-09T15:08:48.608" v="0" actId="20577"/>
-      <pc:docMkLst>
-        <pc:docMk/>
-      </pc:docMkLst>
-      <pc:sldChg chg="modSp mod">
-        <pc:chgData name="Mitchell Wand" userId="de9b44c55c049659" providerId="LiveId" clId="{2F0674E9-A568-49F0-A150-6793737DAAAA}" dt="2022-09-09T15:08:48.608" v="0" actId="20577"/>
-        <pc:sldMkLst>
-          <pc:docMk/>
-          <pc:sldMk cId="2452429264" sldId="379"/>
-        </pc:sldMkLst>
-        <pc:spChg chg="mod">
-          <ac:chgData name="Mitchell Wand" userId="de9b44c55c049659" providerId="LiveId" clId="{2F0674E9-A568-49F0-A150-6793737DAAAA}" dt="2022-09-09T15:08:48.608" v="0" actId="20577"/>
-          <ac:spMkLst>
-            <pc:docMk/>
-            <pc:sldMk cId="2452429264" sldId="379"/>
-            <ac:spMk id="2" creationId="{40765BC5-92E6-4F5A-B981-1C5EE975861B}"/>
-          </ac:spMkLst>
-        </pc:spChg>
-      </pc:sldChg>
-    </pc:docChg>
-  </pc:docChgLst>
-  <pc:docChgLst>
     <pc:chgData name="Mitchell Wand" userId="de9b44c55c049659" providerId="LiveId" clId="{99718308-7C56-473B-8B2B-53B03B1B7395}"/>
     <pc:docChg chg="undo custSel addSld modSld">
       <pc:chgData name="Mitchell Wand" userId="de9b44c55c049659" providerId="LiveId" clId="{99718308-7C56-473B-8B2B-53B03B1B7395}" dt="2022-09-14T18:51:01.402" v="704" actId="27636"/>
@@ -949,6 +925,30 @@
             <pc:docMk/>
             <pc:sldMk cId="3605028067" sldId="495"/>
             <ac:spMk id="11" creationId="{1B7168C4-C6D5-1024-A1FA-7A1C9E11C8D2}"/>
+          </ac:spMkLst>
+        </pc:spChg>
+      </pc:sldChg>
+    </pc:docChg>
+  </pc:docChgLst>
+  <pc:docChgLst>
+    <pc:chgData name="Mitchell Wand" userId="de9b44c55c049659" providerId="LiveId" clId="{2F0674E9-A568-49F0-A150-6793737DAAAA}"/>
+    <pc:docChg chg="modSld">
+      <pc:chgData name="Mitchell Wand" userId="de9b44c55c049659" providerId="LiveId" clId="{2F0674E9-A568-49F0-A150-6793737DAAAA}" dt="2022-09-09T15:08:48.608" v="0" actId="20577"/>
+      <pc:docMkLst>
+        <pc:docMk/>
+      </pc:docMkLst>
+      <pc:sldChg chg="modSp mod">
+        <pc:chgData name="Mitchell Wand" userId="de9b44c55c049659" providerId="LiveId" clId="{2F0674E9-A568-49F0-A150-6793737DAAAA}" dt="2022-09-09T15:08:48.608" v="0" actId="20577"/>
+        <pc:sldMkLst>
+          <pc:docMk/>
+          <pc:sldMk cId="2452429264" sldId="379"/>
+        </pc:sldMkLst>
+        <pc:spChg chg="mod">
+          <ac:chgData name="Mitchell Wand" userId="de9b44c55c049659" providerId="LiveId" clId="{2F0674E9-A568-49F0-A150-6793737DAAAA}" dt="2022-09-09T15:08:48.608" v="0" actId="20577"/>
+          <ac:spMkLst>
+            <pc:docMk/>
+            <pc:sldMk cId="2452429264" sldId="379"/>
+            <ac:spMk id="2" creationId="{40765BC5-92E6-4F5A-B981-1C5EE975861B}"/>
           </ac:spMkLst>
         </pc:spChg>
       </pc:sldChg>
@@ -2114,7 +2114,7 @@
   <dgm:whole/>
   <dgm:extLst>
     <a:ext uri="http://schemas.microsoft.com/office/drawing/2008/diagram">
-      <dsp:dataModelExt xmlns:dsp="http://schemas.microsoft.com/office/drawing/2008/diagram" relId="rId6" minVer="http://schemas.openxmlformats.org/drawingml/2006/diagram"/>
+      <dsp:dataModelExt xmlns:dsp="http://schemas.microsoft.com/office/drawing/2008/diagram" relId="rId7" minVer="http://schemas.openxmlformats.org/drawingml/2006/diagram"/>
     </a:ext>
   </dgm:extLst>
 </dgm:dataModel>
@@ -4001,7 +4001,7 @@
           <a:p>
             <a:fld id="{7C7E5181-6CF5-45F7-A87A-E0E0B1FD7549}" type="datetimeFigureOut">
               <a:rPr lang="en-US" smtClean="0"/>
-              <a:t>9/14/2022</a:t>
+              <a:t>9/15/2022</a:t>
             </a:fld>
             <a:endParaRPr lang="en-US"/>
           </a:p>
@@ -4396,10 +4396,86 @@
           <a:bodyPr/>
           <a:lstStyle/>
           <a:p>
-            <a:r>
-              <a:rPr lang="en-US" dirty="0"/>
-              <a:t>“Make Your Data Mean Something” What does that mean?  It means that when you design your data, you need to do three things: &lt;read bullets&gt;</a:t>
-            </a:r>
+            <a:pPr marL="0" marR="0" lvl="0" indent="0" algn="l" defTabSz="914400" rtl="0" eaLnBrk="1" fontAlgn="auto" latinLnBrk="0" hangingPunct="1">
+              <a:lnSpc>
+                <a:spcPct val="100000"/>
+              </a:lnSpc>
+              <a:spcBef>
+                <a:spcPts val="0"/>
+              </a:spcBef>
+              <a:spcAft>
+                <a:spcPts val="0"/>
+              </a:spcAft>
+              <a:buClrTx/>
+              <a:buSzTx/>
+              <a:buFontTx/>
+              <a:buNone/>
+              <a:tabLst/>
+              <a:defRPr/>
+            </a:pPr>
+            <a:r>
+              <a:rPr lang="en-US" dirty="0">
+                <a:solidFill>
+                  <a:schemeClr val="tx1"/>
+                </a:solidFill>
+              </a:rPr>
+              <a:t>What are you checking it for? Length? Illegal Syntax? or what?</a:t>
+            </a:r>
+          </a:p>
+          <a:p>
+            <a:pPr marL="0" marR="0" lvl="0" indent="0" algn="l" defTabSz="914400" rtl="0" eaLnBrk="1" fontAlgn="auto" latinLnBrk="0" hangingPunct="1">
+              <a:lnSpc>
+                <a:spcPct val="100000"/>
+              </a:lnSpc>
+              <a:spcBef>
+                <a:spcPts val="0"/>
+              </a:spcBef>
+              <a:spcAft>
+                <a:spcPts val="0"/>
+              </a:spcAft>
+              <a:buClrTx/>
+              <a:buSzTx/>
+              <a:buFontTx/>
+              <a:buNone/>
+              <a:tabLst/>
+              <a:defRPr/>
+            </a:pPr>
+            <a:r>
+              <a:rPr lang="en-US" dirty="0">
+                <a:solidFill>
+                  <a:schemeClr val="tx1"/>
+                </a:solidFill>
+              </a:rPr>
+              <a:t>&lt;click&gt;</a:t>
+            </a:r>
+          </a:p>
+          <a:p>
+            <a:pPr marL="0" marR="0" lvl="0" indent="0" algn="l" defTabSz="914400" rtl="0" eaLnBrk="1" fontAlgn="auto" latinLnBrk="0" hangingPunct="1">
+              <a:lnSpc>
+                <a:spcPct val="100000"/>
+              </a:lnSpc>
+              <a:spcBef>
+                <a:spcPts val="0"/>
+              </a:spcBef>
+              <a:spcAft>
+                <a:spcPts val="0"/>
+              </a:spcAft>
+              <a:buClrTx/>
+              <a:buSzTx/>
+              <a:buFontTx/>
+              <a:buNone/>
+              <a:tabLst/>
+              <a:defRPr/>
+            </a:pPr>
+            <a:r>
+              <a:rPr lang="en-US" dirty="0">
+                <a:solidFill>
+                  <a:schemeClr val="tx1"/>
+                </a:solidFill>
+              </a:rPr>
+              <a:t>Ahh, now we know!  </a:t>
+            </a:r>
+            <a:endParaRPr lang="en-US" dirty="0"/>
           </a:p>
         </p:txBody>
       </p:sp>
@@ -4420,7 +4496,7 @@
           <a:p>
             <a:fld id="{07937F07-1250-4CCE-B198-1B2887014F41}" type="slidenum">
               <a:rPr lang="en-US" smtClean="0"/>
-              <a:t>13</a:t>
+              <a:t>11</a:t>
             </a:fld>
             <a:endParaRPr lang="en-US"/>
           </a:p>
@@ -4429,7 +4505,7 @@
     </p:spTree>
     <p:extLst>
       <p:ext uri="{BB962C8B-B14F-4D97-AF65-F5344CB8AC3E}">
-        <p14:creationId xmlns:p14="http://schemas.microsoft.com/office/powerpoint/2010/main" val="2690553912"/>
+        <p14:creationId xmlns:p14="http://schemas.microsoft.com/office/powerpoint/2010/main" val="3311314528"/>
       </p:ext>
     </p:extLst>
   </p:cSld>
@@ -4483,10 +4559,136 @@
           <a:bodyPr/>
           <a:lstStyle/>
           <a:p>
-            <a:r>
-              <a:rPr lang="en-US" dirty="0"/>
-              <a:t>&lt;read slide&gt;</a:t>
-            </a:r>
+            <a:pPr marL="0" marR="0" lvl="0" indent="0" algn="l" defTabSz="914400" rtl="0" eaLnBrk="1" fontAlgn="auto" latinLnBrk="0" hangingPunct="1">
+              <a:lnSpc>
+                <a:spcPct val="100000"/>
+              </a:lnSpc>
+              <a:spcBef>
+                <a:spcPts val="0"/>
+              </a:spcBef>
+              <a:spcAft>
+                <a:spcPts val="0"/>
+              </a:spcAft>
+              <a:buClrTx/>
+              <a:buSzTx/>
+              <a:buFontTx/>
+              <a:buNone/>
+              <a:tabLst/>
+              <a:defRPr/>
+            </a:pPr>
+            <a:r>
+              <a:rPr lang="en-US" dirty="0">
+                <a:solidFill>
+                  <a:schemeClr val="tx1"/>
+                </a:solidFill>
+              </a:rPr>
+              <a:t>In the real world, your workplace should have coding standards for things like this</a:t>
+            </a:r>
+          </a:p>
+          <a:p>
+            <a:pPr marL="0" marR="0" lvl="0" indent="0" algn="l" defTabSz="914400" rtl="0" eaLnBrk="1" fontAlgn="auto" latinLnBrk="0" hangingPunct="1">
+              <a:lnSpc>
+                <a:spcPct val="100000"/>
+              </a:lnSpc>
+              <a:spcBef>
+                <a:spcPts val="0"/>
+              </a:spcBef>
+              <a:spcAft>
+                <a:spcPts val="0"/>
+              </a:spcAft>
+              <a:buClrTx/>
+              <a:buSzTx/>
+              <a:buFontTx/>
+              <a:buNone/>
+              <a:tabLst/>
+              <a:defRPr/>
+            </a:pPr>
+            <a:endParaRPr lang="en-US" dirty="0">
+              <a:solidFill>
+                <a:schemeClr val="tx1"/>
+              </a:solidFill>
+            </a:endParaRPr>
+          </a:p>
+          <a:p>
+            <a:pPr marL="0" marR="0" lvl="0" indent="0" algn="l" defTabSz="914400" rtl="0" eaLnBrk="1" fontAlgn="auto" latinLnBrk="0" hangingPunct="1">
+              <a:lnSpc>
+                <a:spcPct val="100000"/>
+              </a:lnSpc>
+              <a:spcBef>
+                <a:spcPts val="0"/>
+              </a:spcBef>
+              <a:spcAft>
+                <a:spcPts val="0"/>
+              </a:spcAft>
+              <a:buClrTx/>
+              <a:buSzTx/>
+              <a:buFontTx/>
+              <a:buNone/>
+              <a:tabLst/>
+              <a:defRPr/>
+            </a:pPr>
+            <a:r>
+              <a:rPr lang="en-US" dirty="0">
+                <a:solidFill>
+                  <a:schemeClr val="tx1"/>
+                </a:solidFill>
+              </a:rPr>
+              <a:t>This particular convention is part of Prof. Wand's personal coding practice. .  You’ll see similar conventions in the names we chose for the functions in Homework 1.</a:t>
+            </a:r>
+          </a:p>
+          <a:p>
+            <a:pPr marL="0" marR="0" lvl="0" indent="0" algn="l" defTabSz="914400" rtl="0" eaLnBrk="1" fontAlgn="auto" latinLnBrk="0" hangingPunct="1">
+              <a:lnSpc>
+                <a:spcPct val="100000"/>
+              </a:lnSpc>
+              <a:spcBef>
+                <a:spcPts val="0"/>
+              </a:spcBef>
+              <a:spcAft>
+                <a:spcPts val="0"/>
+              </a:spcAft>
+              <a:buClrTx/>
+              <a:buSzTx/>
+              <a:buFontTx/>
+              <a:buNone/>
+              <a:tabLst/>
+              <a:defRPr/>
+            </a:pPr>
+            <a:endParaRPr lang="en-US" dirty="0">
+              <a:solidFill>
+                <a:schemeClr val="tx1"/>
+              </a:solidFill>
+            </a:endParaRPr>
+          </a:p>
+          <a:p>
+            <a:pPr marL="0" marR="0" lvl="0" indent="0" algn="l" defTabSz="914400" rtl="0" eaLnBrk="1" fontAlgn="auto" latinLnBrk="0" hangingPunct="1">
+              <a:lnSpc>
+                <a:spcPct val="100000"/>
+              </a:lnSpc>
+              <a:spcBef>
+                <a:spcPts val="0"/>
+              </a:spcBef>
+              <a:spcAft>
+                <a:spcPts val="0"/>
+              </a:spcAft>
+              <a:buClrTx/>
+              <a:buSzTx/>
+              <a:buFontTx/>
+              <a:buNone/>
+              <a:tabLst/>
+              <a:defRPr/>
+            </a:pPr>
+            <a:r>
+              <a:rPr lang="en-US" dirty="0">
+                <a:solidFill>
+                  <a:schemeClr val="tx1"/>
+                </a:solidFill>
+              </a:rPr>
+              <a:t>When you work on your team project, you may want to decide about the coding conventions you will use.</a:t>
+            </a:r>
+          </a:p>
+          <a:p>
+            <a:endParaRPr lang="en-US" dirty="0"/>
           </a:p>
         </p:txBody>
       </p:sp>
@@ -4507,7 +4709,7 @@
           <a:p>
             <a:fld id="{07937F07-1250-4CCE-B198-1B2887014F41}" type="slidenum">
               <a:rPr lang="en-US" smtClean="0"/>
-              <a:t>14</a:t>
+              <a:t>12</a:t>
             </a:fld>
             <a:endParaRPr lang="en-US"/>
           </a:p>
@@ -4516,7 +4718,7 @@
     </p:spTree>
     <p:extLst>
       <p:ext uri="{BB962C8B-B14F-4D97-AF65-F5344CB8AC3E}">
-        <p14:creationId xmlns:p14="http://schemas.microsoft.com/office/powerpoint/2010/main" val="3489124549"/>
+        <p14:creationId xmlns:p14="http://schemas.microsoft.com/office/powerpoint/2010/main" val="3430801820"/>
       </p:ext>
     </p:extLst>
   </p:cSld>
@@ -4572,30 +4774,7 @@
           <a:p>
             <a:r>
               <a:rPr lang="en-US" dirty="0"/>
-              <a:t>We need to define a type Shirt, which will be the data type that represent shirts.  Inside that data type, there will be a field called color, and we need to record the fact that this field represents the color of the shirt.</a:t>
-            </a:r>
-          </a:p>
-          <a:p>
-            <a:r>
-              <a:rPr lang="en-US" dirty="0"/>
-              <a:t>We need to define a type Color, which will be the data type for representing colors.</a:t>
-            </a:r>
-          </a:p>
-          <a:p>
-            <a:endParaRPr lang="en-US" dirty="0"/>
-          </a:p>
-          <a:p>
-            <a:r>
-              <a:rPr lang="en-US" dirty="0"/>
-              <a:t>And when we need to represent my shirt, we’ll define a variable </a:t>
-            </a:r>
-            <a:r>
-              <a:rPr lang="en-US" dirty="0" err="1"/>
-              <a:t>myShirt</a:t>
-            </a:r>
-            <a:r>
-              <a:rPr lang="en-US" dirty="0"/>
-              <a:t>, and we need to record the fact that this variable contains a representation of my shirt.</a:t>
+              <a:t>“Make Your Data Mean Something” What does that mean?  It means that when you design your data, you need to do three things: &lt;read bullets&gt;</a:t>
             </a:r>
           </a:p>
         </p:txBody>
@@ -4617,7 +4796,7 @@
           <a:p>
             <a:fld id="{07937F07-1250-4CCE-B198-1B2887014F41}" type="slidenum">
               <a:rPr lang="en-US" smtClean="0"/>
-              <a:t>15</a:t>
+              <a:t>13</a:t>
             </a:fld>
             <a:endParaRPr lang="en-US"/>
           </a:p>
@@ -4626,7 +4805,7 @@
     </p:spTree>
     <p:extLst>
       <p:ext uri="{BB962C8B-B14F-4D97-AF65-F5344CB8AC3E}">
-        <p14:creationId xmlns:p14="http://schemas.microsoft.com/office/powerpoint/2010/main" val="1229773625"/>
+        <p14:creationId xmlns:p14="http://schemas.microsoft.com/office/powerpoint/2010/main" val="2690553912"/>
       </p:ext>
     </p:extLst>
   </p:cSld>
@@ -4682,56 +4861,8 @@
           <a:p>
             <a:r>
               <a:rPr lang="en-US" dirty="0"/>
-              <a:t>Here’s the big picture. On the left, we have a fact about the real world: my shirt is red. </a:t>
-            </a:r>
-          </a:p>
-          <a:p>
-            <a:r>
-              <a:rPr lang="en-US" dirty="0"/>
-              <a:t>On the right, we see how that real-world fact is represented in our code.</a:t>
-            </a:r>
-          </a:p>
-          <a:p>
-            <a:endParaRPr lang="en-US" dirty="0"/>
-          </a:p>
-          <a:p>
-            <a:r>
-              <a:rPr lang="en-US" dirty="0"/>
-              <a:t>We *represent* a real-world fact in code</a:t>
-            </a:r>
-          </a:p>
-          <a:p>
-            <a:r>
-              <a:rPr lang="en-US" dirty="0"/>
-              <a:t>We *interpret* the code as a real-world fact.</a:t>
-            </a:r>
-          </a:p>
-          <a:p>
-            <a:endParaRPr lang="en-US" dirty="0"/>
-          </a:p>
-          <a:p>
-            <a:r>
-              <a:rPr lang="en-US" dirty="0"/>
-              <a:t>How do we know these are connected? We have to *write it down*.  </a:t>
-            </a:r>
-          </a:p>
-          <a:p>
-            <a:r>
-              <a:rPr lang="en-US" dirty="0"/>
-              <a:t>Otherwise the next person who looks at this code won’t know what we meant.</a:t>
-            </a:r>
-          </a:p>
-          <a:p>
-            <a:endParaRPr lang="en-US" dirty="0"/>
-          </a:p>
-          <a:p>
-            <a:r>
-              <a:rPr lang="en-US" dirty="0"/>
-              <a:t>In our Typescript system, we do that in the comments.</a:t>
-            </a:r>
-          </a:p>
-          <a:p>
-            <a:endParaRPr lang="en-US" dirty="0"/>
+              <a:t>&lt;read slide&gt;</a:t>
+            </a:r>
           </a:p>
         </p:txBody>
       </p:sp>
@@ -4752,7 +4883,7 @@
           <a:p>
             <a:fld id="{07937F07-1250-4CCE-B198-1B2887014F41}" type="slidenum">
               <a:rPr lang="en-US" smtClean="0"/>
-              <a:t>16</a:t>
+              <a:t>14</a:t>
             </a:fld>
             <a:endParaRPr lang="en-US"/>
           </a:p>
@@ -4761,7 +4892,7 @@
     </p:spTree>
     <p:extLst>
       <p:ext uri="{BB962C8B-B14F-4D97-AF65-F5344CB8AC3E}">
-        <p14:creationId xmlns:p14="http://schemas.microsoft.com/office/powerpoint/2010/main" val="149464898"/>
+        <p14:creationId xmlns:p14="http://schemas.microsoft.com/office/powerpoint/2010/main" val="3489124549"/>
       </p:ext>
     </p:extLst>
   </p:cSld>
@@ -4817,25 +4948,30 @@
           <a:p>
             <a:r>
               <a:rPr lang="en-US" dirty="0"/>
-              <a:t>You’ve already run across the importance of writing down the interpretation. </a:t>
+              <a:t>We need to define a type Shirt, which will be the data type that represent shirts.  Inside that data type, there will be a field called color, and we need to record the fact that this field represents the color of the shirt.</a:t>
             </a:r>
           </a:p>
           <a:p>
             <a:r>
               <a:rPr lang="en-US" dirty="0"/>
-              <a:t>In this example, what do x and y mean? </a:t>
-            </a:r>
+              <a:t>We need to define a type Color, which will be the data type for representing colors.</a:t>
+            </a:r>
+          </a:p>
+          <a:p>
+            <a:endParaRPr lang="en-US" dirty="0"/>
           </a:p>
           <a:p>
             <a:r>
               <a:rPr lang="en-US" dirty="0"/>
-              <a:t>&lt;build through 5 animations&gt;</a:t>
-            </a:r>
-          </a:p>
-          <a:p>
+              <a:t>And when we need to represent my shirt, we’ll define a variable </a:t>
+            </a:r>
+            <a:r>
+              <a:rPr lang="en-US" dirty="0" err="1"/>
+              <a:t>myShirt</a:t>
+            </a:r>
             <a:r>
               <a:rPr lang="en-US" dirty="0"/>
-              <a:t>Just count the number of questions about this on Piazza!!</a:t>
+              <a:t>, and we need to record the fact that this variable contains a representation of my shirt.</a:t>
             </a:r>
           </a:p>
         </p:txBody>
@@ -4857,7 +4993,7 @@
           <a:p>
             <a:fld id="{07937F07-1250-4CCE-B198-1B2887014F41}" type="slidenum">
               <a:rPr lang="en-US" smtClean="0"/>
-              <a:t>17</a:t>
+              <a:t>15</a:t>
             </a:fld>
             <a:endParaRPr lang="en-US"/>
           </a:p>
@@ -4866,7 +5002,7 @@
     </p:spTree>
     <p:extLst>
       <p:ext uri="{BB962C8B-B14F-4D97-AF65-F5344CB8AC3E}">
-        <p14:creationId xmlns:p14="http://schemas.microsoft.com/office/powerpoint/2010/main" val="3859533786"/>
+        <p14:creationId xmlns:p14="http://schemas.microsoft.com/office/powerpoint/2010/main" val="1229773625"/>
       </p:ext>
     </p:extLst>
   </p:cSld>
@@ -4922,26 +5058,56 @@
           <a:p>
             <a:r>
               <a:rPr lang="en-US" dirty="0"/>
-              <a:t>Here’s another example.</a:t>
+              <a:t>Here’s the big picture. On the left, we have a fact about the real world: my shirt is red. </a:t>
             </a:r>
           </a:p>
           <a:p>
             <a:r>
               <a:rPr lang="en-US" dirty="0"/>
-              <a:t>&lt;read slide, and click 3 times to view the whole animation&gt;</a:t>
-            </a:r>
+              <a:t>On the right, we see how that real-world fact is represented in our code.</a:t>
+            </a:r>
+          </a:p>
+          <a:p>
+            <a:endParaRPr lang="en-US" dirty="0"/>
           </a:p>
           <a:p>
             <a:r>
               <a:rPr lang="en-US" dirty="0"/>
-              <a:t>Note that this UML diagram gives us some information about this:  it says that each wheel object is “had” by exactly one car object. </a:t>
+              <a:t>We *represent* a real-world fact in code</a:t>
             </a:r>
           </a:p>
           <a:p>
             <a:r>
               <a:rPr lang="en-US" dirty="0"/>
-              <a:t>But this is pretty well-hidden.  It would have been helpful if the person who wrote this UML documented exactly what they meant..</a:t>
-            </a:r>
+              <a:t>We *interpret* the code as a real-world fact.</a:t>
+            </a:r>
+          </a:p>
+          <a:p>
+            <a:endParaRPr lang="en-US" dirty="0"/>
+          </a:p>
+          <a:p>
+            <a:r>
+              <a:rPr lang="en-US" dirty="0"/>
+              <a:t>How do we know these are connected? We have to *write it down*.  </a:t>
+            </a:r>
+          </a:p>
+          <a:p>
+            <a:r>
+              <a:rPr lang="en-US" dirty="0"/>
+              <a:t>Otherwise the next person who looks at this code won’t know what we meant.</a:t>
+            </a:r>
+          </a:p>
+          <a:p>
+            <a:endParaRPr lang="en-US" dirty="0"/>
+          </a:p>
+          <a:p>
+            <a:r>
+              <a:rPr lang="en-US" dirty="0"/>
+              <a:t>In our Typescript system, we do that in the comments.</a:t>
+            </a:r>
+          </a:p>
+          <a:p>
+            <a:endParaRPr lang="en-US" dirty="0"/>
           </a:p>
         </p:txBody>
       </p:sp>
@@ -4962,7 +5128,7 @@
           <a:p>
             <a:fld id="{07937F07-1250-4CCE-B198-1B2887014F41}" type="slidenum">
               <a:rPr lang="en-US" smtClean="0"/>
-              <a:t>18</a:t>
+              <a:t>16</a:t>
             </a:fld>
             <a:endParaRPr lang="en-US"/>
           </a:p>
@@ -4971,7 +5137,7 @@
     </p:spTree>
     <p:extLst>
       <p:ext uri="{BB962C8B-B14F-4D97-AF65-F5344CB8AC3E}">
-        <p14:creationId xmlns:p14="http://schemas.microsoft.com/office/powerpoint/2010/main" val="1750295784"/>
+        <p14:creationId xmlns:p14="http://schemas.microsoft.com/office/powerpoint/2010/main" val="149464898"/>
       </p:ext>
     </p:extLst>
   </p:cSld>
@@ -5027,38 +5193,26 @@
           <a:p>
             <a:r>
               <a:rPr lang="en-US" dirty="0"/>
-              <a:t>&lt;Read slide&gt;</a:t>
-            </a:r>
-          </a:p>
-          <a:p>
-            <a:pPr marL="0" marR="0" lvl="0" indent="0" algn="l" defTabSz="914400" rtl="0" eaLnBrk="1" fontAlgn="auto" latinLnBrk="0" hangingPunct="1">
-              <a:lnSpc>
-                <a:spcPct val="100000"/>
-              </a:lnSpc>
-              <a:spcBef>
-                <a:spcPts val="0"/>
-              </a:spcBef>
-              <a:spcAft>
-                <a:spcPts val="0"/>
-              </a:spcAft>
-              <a:buClrTx/>
-              <a:buSzTx/>
-              <a:buFontTx/>
-              <a:buNone/>
-              <a:tabLst/>
-              <a:defRPr/>
-            </a:pPr>
-            <a:r>
-              <a:rPr lang="en-US" dirty="0">
-                <a:solidFill>
-                  <a:schemeClr val="tx1"/>
-                </a:solidFill>
-              </a:rPr>
-              <a:t>The fancy name for this is "The Single Responsibility Principle".  You can use this if you want to impress your coop interviewer.</a:t>
-            </a:r>
-          </a:p>
-          <a:p>
-            <a:endParaRPr lang="en-US" dirty="0"/>
+              <a:t>You’ve already run across the importance of writing down the interpretation. </a:t>
+            </a:r>
+          </a:p>
+          <a:p>
+            <a:r>
+              <a:rPr lang="en-US" dirty="0"/>
+              <a:t>In this example, what do x and y mean? </a:t>
+            </a:r>
+          </a:p>
+          <a:p>
+            <a:r>
+              <a:rPr lang="en-US" dirty="0"/>
+              <a:t>&lt;build through 5 animations&gt;</a:t>
+            </a:r>
+          </a:p>
+          <a:p>
+            <a:r>
+              <a:rPr lang="en-US" dirty="0"/>
+              <a:t>Just count the number of questions about this on Piazza!!</a:t>
+            </a:r>
           </a:p>
         </p:txBody>
       </p:sp>
@@ -5079,7 +5233,7 @@
           <a:p>
             <a:fld id="{07937F07-1250-4CCE-B198-1B2887014F41}" type="slidenum">
               <a:rPr lang="en-US" smtClean="0"/>
-              <a:t>19</a:t>
+              <a:t>17</a:t>
             </a:fld>
             <a:endParaRPr lang="en-US"/>
           </a:p>
@@ -5088,7 +5242,7 @@
     </p:spTree>
     <p:extLst>
       <p:ext uri="{BB962C8B-B14F-4D97-AF65-F5344CB8AC3E}">
-        <p14:creationId xmlns:p14="http://schemas.microsoft.com/office/powerpoint/2010/main" val="3095489065"/>
+        <p14:creationId xmlns:p14="http://schemas.microsoft.com/office/powerpoint/2010/main" val="3859533786"/>
       </p:ext>
     </p:extLst>
   </p:cSld>
@@ -5144,65 +5298,26 @@
           <a:p>
             <a:r>
               <a:rPr lang="en-US" dirty="0"/>
-              <a:t>If you have some quantity that you use more than once, give it a name and use the name.</a:t>
+              <a:t>Here’s another example.</a:t>
             </a:r>
           </a:p>
           <a:p>
             <a:r>
               <a:rPr lang="en-US" dirty="0"/>
-              <a:t>That way you only need to change it in one place!</a:t>
+              <a:t>&lt;read slide, and click 3 times to view the whole animation&gt;</a:t>
             </a:r>
           </a:p>
           <a:p>
             <a:r>
               <a:rPr lang="en-US" dirty="0"/>
-              <a:t>If you have some task that you do in many places, make it into a procedure.</a:t>
-            </a:r>
-          </a:p>
-          <a:p>
-            <a:pPr marL="0" marR="0" lvl="0" indent="0" algn="l" defTabSz="914400" rtl="0" eaLnBrk="1" fontAlgn="auto" latinLnBrk="0" hangingPunct="1">
-              <a:lnSpc>
-                <a:spcPct val="100000"/>
-              </a:lnSpc>
-              <a:spcBef>
-                <a:spcPts val="0"/>
-              </a:spcBef>
-              <a:spcAft>
-                <a:spcPts val="0"/>
-              </a:spcAft>
-              <a:buClrTx/>
-              <a:buSzTx/>
-              <a:buFontTx/>
-              <a:buNone/>
-              <a:tabLst/>
-              <a:defRPr/>
-            </a:pPr>
-            <a:r>
-              <a:rPr lang="en-US" dirty="0">
-                <a:solidFill>
-                  <a:schemeClr val="tx1"/>
-                </a:solidFill>
-              </a:rPr>
-              <a:t>This is called "Single Point of Control"</a:t>
-            </a:r>
-          </a:p>
-          <a:p>
-            <a:endParaRPr lang="en-US" dirty="0"/>
+              <a:t>Note that this UML diagram gives us some information about this:  it says that each wheel object is “had” by exactly one car object. </a:t>
+            </a:r>
           </a:p>
           <a:p>
             <a:r>
               <a:rPr lang="en-US" dirty="0"/>
-              <a:t>And of course you should use a good name</a:t>
-            </a:r>
-          </a:p>
-          <a:p>
-            <a:endParaRPr lang="en-US" dirty="0"/>
-          </a:p>
-          <a:p>
-            <a:endParaRPr lang="en-US" dirty="0"/>
-          </a:p>
-          <a:p>
-            <a:endParaRPr lang="en-US" dirty="0"/>
+              <a:t>But this is pretty well-hidden.  It would have been helpful if the person who wrote this UML documented exactly what they meant..</a:t>
+            </a:r>
           </a:p>
         </p:txBody>
       </p:sp>
@@ -5223,7 +5338,7 @@
           <a:p>
             <a:fld id="{07937F07-1250-4CCE-B198-1B2887014F41}" type="slidenum">
               <a:rPr lang="en-US" smtClean="0"/>
-              <a:t>20</a:t>
+              <a:t>18</a:t>
             </a:fld>
             <a:endParaRPr lang="en-US"/>
           </a:p>
@@ -5232,7 +5347,7 @@
     </p:spTree>
     <p:extLst>
       <p:ext uri="{BB962C8B-B14F-4D97-AF65-F5344CB8AC3E}">
-        <p14:creationId xmlns:p14="http://schemas.microsoft.com/office/powerpoint/2010/main" val="940312364"/>
+        <p14:creationId xmlns:p14="http://schemas.microsoft.com/office/powerpoint/2010/main" val="1750295784"/>
       </p:ext>
     </p:extLst>
   </p:cSld>
@@ -5288,20 +5403,8 @@
           <a:p>
             <a:r>
               <a:rPr lang="en-US" dirty="0"/>
-              <a:t>Here’s an actual example, from a couple of semesters ago, in Jest..</a:t>
-            </a:r>
-          </a:p>
-          <a:p>
-            <a:endParaRPr lang="en-US" dirty="0"/>
-          </a:p>
-          <a:p>
-            <a:r>
-              <a:rPr lang="en-US" dirty="0"/>
-              <a:t>Think of how much typing this saves!</a:t>
-            </a:r>
-          </a:p>
-          <a:p>
-            <a:endParaRPr lang="en-US" dirty="0"/>
+              <a:t>&lt;Read slide&gt;</a:t>
+            </a:r>
           </a:p>
           <a:p>
             <a:pPr marL="0" marR="0" lvl="0" indent="0" algn="l" defTabSz="914400" rtl="0" eaLnBrk="1" fontAlgn="auto" latinLnBrk="0" hangingPunct="1">
@@ -5327,104 +5430,8 @@
                   <a:schemeClr val="tx1"/>
                 </a:solidFill>
               </a:rPr>
-              <a:t>Plus, if I ever need to change what </a:t>
-            </a:r>
-            <a:r>
-              <a:rPr lang="en-US" b="1" dirty="0" err="1">
-                <a:solidFill>
-                  <a:schemeClr val="tx1"/>
-                </a:solidFill>
-              </a:rPr>
-              <a:t>testequal</a:t>
-            </a:r>
-            <a:r>
-              <a:rPr lang="en-US" dirty="0">
-                <a:solidFill>
-                  <a:schemeClr val="tx1"/>
-                </a:solidFill>
-              </a:rPr>
-              <a:t> does, I can do it all in one place.</a:t>
-            </a:r>
-          </a:p>
-          <a:p>
-            <a:pPr marL="0" marR="0" lvl="0" indent="0" algn="l" defTabSz="914400" rtl="0" eaLnBrk="1" fontAlgn="auto" latinLnBrk="0" hangingPunct="1">
-              <a:lnSpc>
-                <a:spcPct val="100000"/>
-              </a:lnSpc>
-              <a:spcBef>
-                <a:spcPts val="0"/>
-              </a:spcBef>
-              <a:spcAft>
-                <a:spcPts val="0"/>
-              </a:spcAft>
-              <a:buClrTx/>
-              <a:buSzTx/>
-              <a:buFontTx/>
-              <a:buNone/>
-              <a:tabLst/>
-              <a:defRPr/>
-            </a:pPr>
-            <a:endParaRPr lang="en-US" dirty="0">
-              <a:solidFill>
-                <a:schemeClr val="tx1"/>
-              </a:solidFill>
-            </a:endParaRPr>
-          </a:p>
-          <a:p>
-            <a:pPr marL="0" marR="0" lvl="0" indent="0" algn="l" defTabSz="914400" rtl="0" eaLnBrk="1" fontAlgn="auto" latinLnBrk="0" hangingPunct="1">
-              <a:lnSpc>
-                <a:spcPct val="100000"/>
-              </a:lnSpc>
-              <a:spcBef>
-                <a:spcPts val="0"/>
-              </a:spcBef>
-              <a:spcAft>
-                <a:spcPts val="0"/>
-              </a:spcAft>
-              <a:buClrTx/>
-              <a:buSzTx/>
-              <a:buFontTx/>
-              <a:buNone/>
-              <a:tabLst/>
-              <a:defRPr/>
-            </a:pPr>
-            <a:r>
-              <a:rPr lang="en-US" dirty="0">
-                <a:solidFill>
-                  <a:schemeClr val="tx1"/>
-                </a:solidFill>
-              </a:rPr>
-              <a:t>Note: Jest has a built-in abstraction for this, called </a:t>
-            </a:r>
-            <a:r>
-              <a:rPr lang="en-US" b="1" dirty="0" err="1">
-                <a:solidFill>
-                  <a:schemeClr val="tx1"/>
-                </a:solidFill>
-              </a:rPr>
-              <a:t>test.each</a:t>
-            </a:r>
-            <a:r>
-              <a:rPr lang="en-US" b="1" dirty="0">
-                <a:solidFill>
-                  <a:schemeClr val="tx1"/>
-                </a:solidFill>
-              </a:rPr>
-              <a:t> </a:t>
-            </a:r>
-            <a:r>
-              <a:rPr lang="en-US" b="0" dirty="0">
-                <a:solidFill>
-                  <a:schemeClr val="tx1"/>
-                </a:solidFill>
-              </a:rPr>
-              <a:t>, but that’s not the point of this example.</a:t>
-            </a:r>
-            <a:endParaRPr lang="en-US" b="1" dirty="0">
-              <a:solidFill>
-                <a:schemeClr val="tx1"/>
-              </a:solidFill>
-            </a:endParaRPr>
+              <a:t>The fancy name for this is "The Single Responsibility Principle".  You can use this if you want to impress your coop interviewer.</a:t>
+            </a:r>
           </a:p>
           <a:p>
             <a:endParaRPr lang="en-US" dirty="0"/>
@@ -5448,7 +5455,7 @@
           <a:p>
             <a:fld id="{07937F07-1250-4CCE-B198-1B2887014F41}" type="slidenum">
               <a:rPr lang="en-US" smtClean="0"/>
-              <a:t>21</a:t>
+              <a:t>19</a:t>
             </a:fld>
             <a:endParaRPr lang="en-US"/>
           </a:p>
@@ -5457,7 +5464,7 @@
     </p:spTree>
     <p:extLst>
       <p:ext uri="{BB962C8B-B14F-4D97-AF65-F5344CB8AC3E}">
-        <p14:creationId xmlns:p14="http://schemas.microsoft.com/office/powerpoint/2010/main" val="790767928"/>
+        <p14:creationId xmlns:p14="http://schemas.microsoft.com/office/powerpoint/2010/main" val="3095489065"/>
       </p:ext>
     </p:extLst>
   </p:cSld>
@@ -5513,8 +5520,65 @@
           <a:p>
             <a:r>
               <a:rPr lang="en-US" dirty="0"/>
-              <a:t>&lt;read slide&gt;</a:t>
-            </a:r>
+              <a:t>If you have some quantity that you use more than once, give it a name and use the name.</a:t>
+            </a:r>
+          </a:p>
+          <a:p>
+            <a:r>
+              <a:rPr lang="en-US" dirty="0"/>
+              <a:t>That way you only need to change it in one place!</a:t>
+            </a:r>
+          </a:p>
+          <a:p>
+            <a:r>
+              <a:rPr lang="en-US" dirty="0"/>
+              <a:t>If you have some task that you do in many places, make it into a procedure.</a:t>
+            </a:r>
+          </a:p>
+          <a:p>
+            <a:pPr marL="0" marR="0" lvl="0" indent="0" algn="l" defTabSz="914400" rtl="0" eaLnBrk="1" fontAlgn="auto" latinLnBrk="0" hangingPunct="1">
+              <a:lnSpc>
+                <a:spcPct val="100000"/>
+              </a:lnSpc>
+              <a:spcBef>
+                <a:spcPts val="0"/>
+              </a:spcBef>
+              <a:spcAft>
+                <a:spcPts val="0"/>
+              </a:spcAft>
+              <a:buClrTx/>
+              <a:buSzTx/>
+              <a:buFontTx/>
+              <a:buNone/>
+              <a:tabLst/>
+              <a:defRPr/>
+            </a:pPr>
+            <a:r>
+              <a:rPr lang="en-US" dirty="0">
+                <a:solidFill>
+                  <a:schemeClr val="tx1"/>
+                </a:solidFill>
+              </a:rPr>
+              <a:t>This is called "Single Point of Control"</a:t>
+            </a:r>
+          </a:p>
+          <a:p>
+            <a:endParaRPr lang="en-US" dirty="0"/>
+          </a:p>
+          <a:p>
+            <a:r>
+              <a:rPr lang="en-US" dirty="0"/>
+              <a:t>And of course you should use a good name</a:t>
+            </a:r>
+          </a:p>
+          <a:p>
+            <a:endParaRPr lang="en-US" dirty="0"/>
+          </a:p>
+          <a:p>
+            <a:endParaRPr lang="en-US" dirty="0"/>
+          </a:p>
+          <a:p>
+            <a:endParaRPr lang="en-US" dirty="0"/>
           </a:p>
         </p:txBody>
       </p:sp>
@@ -5535,7 +5599,7 @@
           <a:p>
             <a:fld id="{07937F07-1250-4CCE-B198-1B2887014F41}" type="slidenum">
               <a:rPr lang="en-US" smtClean="0"/>
-              <a:t>22</a:t>
+              <a:t>20</a:t>
             </a:fld>
             <a:endParaRPr lang="en-US"/>
           </a:p>
@@ -5544,7 +5608,7 @@
     </p:spTree>
     <p:extLst>
       <p:ext uri="{BB962C8B-B14F-4D97-AF65-F5344CB8AC3E}">
-        <p14:creationId xmlns:p14="http://schemas.microsoft.com/office/powerpoint/2010/main" val="3093631808"/>
+        <p14:creationId xmlns:p14="http://schemas.microsoft.com/office/powerpoint/2010/main" val="940312364"/>
       </p:ext>
     </p:extLst>
   </p:cSld>
@@ -5687,20 +5751,82 @@
           <a:p>
             <a:r>
               <a:rPr lang="en-US" dirty="0"/>
-              <a:t>Where did that 1.06 come from?</a:t>
-            </a:r>
-          </a:p>
-          <a:p>
+              <a:t>Here’s an actual example, from a couple of semesters ago, in Jest..</a:t>
+            </a:r>
+          </a:p>
+          <a:p>
+            <a:endParaRPr lang="en-US" dirty="0"/>
+          </a:p>
+          <a:p>
+            <a:r>
+              <a:rPr lang="en-US" dirty="0"/>
+              <a:t>Think of how much typing this saves!</a:t>
+            </a:r>
+          </a:p>
+          <a:p>
+            <a:endParaRPr lang="en-US" dirty="0"/>
+          </a:p>
+          <a:p>
+            <a:pPr marL="0" marR="0" lvl="0" indent="0" algn="l" defTabSz="914400" rtl="0" eaLnBrk="1" fontAlgn="auto" latinLnBrk="0" hangingPunct="1">
+              <a:lnSpc>
+                <a:spcPct val="100000"/>
+              </a:lnSpc>
+              <a:spcBef>
+                <a:spcPts val="0"/>
+              </a:spcBef>
+              <a:spcAft>
+                <a:spcPts val="0"/>
+              </a:spcAft>
+              <a:buClrTx/>
+              <a:buSzTx/>
+              <a:buFontTx/>
+              <a:buNone/>
+              <a:tabLst/>
+              <a:defRPr/>
+            </a:pPr>
             <a:r>
               <a:rPr lang="en-US" dirty="0">
                 <a:solidFill>
                   <a:schemeClr val="tx1"/>
                 </a:solidFill>
               </a:rPr>
-              <a:t>Oh, it's the sales tax?  Are there many occurrences of that 1.06 in your code? (Probably!) Will the sales tax rate ever change? (Probably!)</a:t>
-            </a:r>
-          </a:p>
-          <a:p>
+              <a:t>Plus, if I ever need to change what </a:t>
+            </a:r>
+            <a:r>
+              <a:rPr lang="en-US" b="1" dirty="0" err="1">
+                <a:solidFill>
+                  <a:schemeClr val="tx1"/>
+                </a:solidFill>
+              </a:rPr>
+              <a:t>testequal</a:t>
+            </a:r>
+            <a:r>
+              <a:rPr lang="en-US" dirty="0">
+                <a:solidFill>
+                  <a:schemeClr val="tx1"/>
+                </a:solidFill>
+              </a:rPr>
+              <a:t> does, I can do it all in one place.</a:t>
+            </a:r>
+          </a:p>
+          <a:p>
+            <a:pPr marL="0" marR="0" lvl="0" indent="0" algn="l" defTabSz="914400" rtl="0" eaLnBrk="1" fontAlgn="auto" latinLnBrk="0" hangingPunct="1">
+              <a:lnSpc>
+                <a:spcPct val="100000"/>
+              </a:lnSpc>
+              <a:spcBef>
+                <a:spcPts val="0"/>
+              </a:spcBef>
+              <a:spcAft>
+                <a:spcPts val="0"/>
+              </a:spcAft>
+              <a:buClrTx/>
+              <a:buSzTx/>
+              <a:buFontTx/>
+              <a:buNone/>
+              <a:tabLst/>
+              <a:defRPr/>
+            </a:pPr>
             <a:endParaRPr lang="en-US" dirty="0">
               <a:solidFill>
                 <a:schemeClr val="tx1"/>
@@ -5708,22 +5834,64 @@
             </a:endParaRPr>
           </a:p>
           <a:p>
+            <a:pPr marL="0" marR="0" lvl="0" indent="0" algn="l" defTabSz="914400" rtl="0" eaLnBrk="1" fontAlgn="auto" latinLnBrk="0" hangingPunct="1">
+              <a:lnSpc>
+                <a:spcPct val="100000"/>
+              </a:lnSpc>
+              <a:spcBef>
+                <a:spcPts val="0"/>
+              </a:spcBef>
+              <a:spcAft>
+                <a:spcPts val="0"/>
+              </a:spcAft>
+              <a:buClrTx/>
+              <a:buSzTx/>
+              <a:buFontTx/>
+              <a:buNone/>
+              <a:tabLst/>
+              <a:defRPr/>
+            </a:pPr>
             <a:r>
               <a:rPr lang="en-US" dirty="0">
                 <a:solidFill>
                   <a:schemeClr val="tx1"/>
                 </a:solidFill>
               </a:rPr>
-              <a:t>Let's fix it!&lt;click&gt;</a:t>
-            </a:r>
-          </a:p>
-          <a:p>
-            <a:endParaRPr lang="en-US" dirty="0">
+              <a:t>Note: Jest has a built-in abstraction for this, called </a:t>
+            </a:r>
+            <a:r>
+              <a:rPr lang="en-US" b="1" dirty="0" err="1">
+                <a:solidFill>
+                  <a:schemeClr val="tx1"/>
+                </a:solidFill>
+              </a:rPr>
+              <a:t>test.each</a:t>
+            </a:r>
+            <a:r>
+              <a:rPr lang="en-US" b="1" dirty="0">
+                <a:solidFill>
+                  <a:schemeClr val="tx1"/>
+                </a:solidFill>
+              </a:rPr>
+              <a:t> </a:t>
+            </a:r>
+            <a:r>
+              <a:rPr lang="en-US" b="0" dirty="0">
+                <a:solidFill>
+                  <a:schemeClr val="tx1"/>
+                </a:solidFill>
+              </a:rPr>
+              <a:t>, but that’s not the point of this example.</a:t>
+            </a:r>
+            <a:endParaRPr lang="en-US" b="1" dirty="0">
               <a:solidFill>
                 <a:schemeClr val="tx1"/>
               </a:solidFill>
             </a:endParaRPr>
           </a:p>
+          <a:p>
+            <a:endParaRPr lang="en-US" dirty="0"/>
+          </a:p>
         </p:txBody>
       </p:sp>
       <p:sp>
@@ -5743,7 +5911,7 @@
           <a:p>
             <a:fld id="{07937F07-1250-4CCE-B198-1B2887014F41}" type="slidenum">
               <a:rPr lang="en-US" smtClean="0"/>
-              <a:t>23</a:t>
+              <a:t>21</a:t>
             </a:fld>
             <a:endParaRPr lang="en-US"/>
           </a:p>
@@ -5752,7 +5920,7 @@
     </p:spTree>
     <p:extLst>
       <p:ext uri="{BB962C8B-B14F-4D97-AF65-F5344CB8AC3E}">
-        <p14:creationId xmlns:p14="http://schemas.microsoft.com/office/powerpoint/2010/main" val="3469524703"/>
+        <p14:creationId xmlns:p14="http://schemas.microsoft.com/office/powerpoint/2010/main" val="790767928"/>
       </p:ext>
     </p:extLst>
   </p:cSld>
@@ -5808,18 +5976,6 @@
           <a:p>
             <a:r>
               <a:rPr lang="en-US" dirty="0"/>
-              <a:t>&lt;You can skip this example if you are worried about time&gt;</a:t>
-            </a:r>
-          </a:p>
-          <a:p>
-            <a:r>
-              <a:rPr lang="en-US" dirty="0"/>
-              <a:t>Here’s another example:</a:t>
-            </a:r>
-          </a:p>
-          <a:p>
-            <a:r>
-              <a:rPr lang="en-US" dirty="0"/>
               <a:t>&lt;read slide&gt;</a:t>
             </a:r>
           </a:p>
@@ -5842,7 +5998,7 @@
           <a:p>
             <a:fld id="{07937F07-1250-4CCE-B198-1B2887014F41}" type="slidenum">
               <a:rPr lang="en-US" smtClean="0"/>
-              <a:t>24</a:t>
+              <a:t>22</a:t>
             </a:fld>
             <a:endParaRPr lang="en-US"/>
           </a:p>
@@ -5851,7 +6007,7 @@
     </p:spTree>
     <p:extLst>
       <p:ext uri="{BB962C8B-B14F-4D97-AF65-F5344CB8AC3E}">
-        <p14:creationId xmlns:p14="http://schemas.microsoft.com/office/powerpoint/2010/main" val="1751579969"/>
+        <p14:creationId xmlns:p14="http://schemas.microsoft.com/office/powerpoint/2010/main" val="3093631808"/>
       </p:ext>
     </p:extLst>
   </p:cSld>
@@ -5907,11 +6063,8 @@
           <a:p>
             <a:r>
               <a:rPr lang="en-US" dirty="0"/>
-              <a:t>Here’s a possible piece of code.  </a:t>
-            </a:r>
-          </a:p>
-          <a:p>
-            <a:endParaRPr lang="en-US" dirty="0"/>
+              <a:t>Where did that 1.06 come from?</a:t>
+            </a:r>
           </a:p>
           <a:p>
             <a:r>
@@ -5920,8 +6073,15 @@
                   <a:schemeClr val="tx1"/>
                 </a:solidFill>
               </a:rPr>
-              <a:t>Here we’ve hard-coded the information about the tax brackets.</a:t>
-            </a:r>
+              <a:t>Oh, it's the sales tax?  Are there many occurrences of that 1.06 in your code? (Probably!) Will the sales tax rate ever change? (Probably!)</a:t>
+            </a:r>
+          </a:p>
+          <a:p>
+            <a:endParaRPr lang="en-US" dirty="0">
+              <a:solidFill>
+                <a:schemeClr val="tx1"/>
+              </a:solidFill>
+            </a:endParaRPr>
           </a:p>
           <a:p>
             <a:r>
@@ -5930,69 +6090,15 @@
                   <a:schemeClr val="tx1"/>
                 </a:solidFill>
               </a:rPr>
-              <a:t>But those might certainly change.  What might change?</a:t>
-            </a:r>
-          </a:p>
-          <a:p>
-            <a:r>
-              <a:rPr lang="en-US" dirty="0"/>
-              <a:t>The boundaries of the tax brackets might change </a:t>
-            </a:r>
-          </a:p>
-          <a:p>
-            <a:r>
-              <a:rPr lang="en-US" dirty="0"/>
-              <a:t>The number of brackets might change.   </a:t>
-            </a:r>
-          </a:p>
-          <a:p>
-            <a:endParaRPr lang="en-US" dirty="0"/>
-          </a:p>
-          <a:p>
-            <a:r>
-              <a:rPr lang="en-US" dirty="0"/>
-              <a:t>This tells us that the notion of a “tax bracket” is an important concept.</a:t>
-            </a:r>
-          </a:p>
-          <a:p>
-            <a:endParaRPr lang="en-US" dirty="0"/>
-          </a:p>
-          <a:p>
-            <a:r>
-              <a:rPr lang="en-US" dirty="0"/>
-              <a:t>But this concept is not explicit in the code we’re looking at– it’s hard-wired into the code.</a:t>
-            </a:r>
-          </a:p>
-          <a:p>
-            <a:endParaRPr lang="en-US" dirty="0"/>
-          </a:p>
-          <a:p>
-            <a:r>
-              <a:rPr lang="en-US" dirty="0"/>
-              <a:t>So probably we should have a representation of “a tax bracket” as a piece of data.</a:t>
-            </a:r>
-          </a:p>
-          <a:p>
-            <a:endParaRPr lang="en-US" dirty="0"/>
-          </a:p>
-          <a:p>
-            <a:r>
-              <a:rPr lang="en-US" dirty="0"/>
-              <a:t>And once we realize that “tax bracket” is an important concept, we can  also see that this piece of code violates One Function/One Job:</a:t>
-            </a:r>
-          </a:p>
-          <a:p>
-            <a:r>
-              <a:rPr lang="en-US" dirty="0"/>
-              <a:t>It finds the appropriate bracket AND calculates the appropriate tax.</a:t>
-            </a:r>
-          </a:p>
-          <a:p>
-            <a:pPr lvl="1"/>
-            <a:endParaRPr lang="en-US" dirty="0"/>
-          </a:p>
-          <a:p>
-            <a:endParaRPr lang="en-US" dirty="0"/>
+              <a:t>Let's fix it!&lt;click&gt;</a:t>
+            </a:r>
+          </a:p>
+          <a:p>
+            <a:endParaRPr lang="en-US" dirty="0">
+              <a:solidFill>
+                <a:schemeClr val="tx1"/>
+              </a:solidFill>
+            </a:endParaRPr>
           </a:p>
         </p:txBody>
       </p:sp>
@@ -6013,7 +6119,7 @@
           <a:p>
             <a:fld id="{07937F07-1250-4CCE-B198-1B2887014F41}" type="slidenum">
               <a:rPr lang="en-US" smtClean="0"/>
-              <a:t>25</a:t>
+              <a:t>23</a:t>
             </a:fld>
             <a:endParaRPr lang="en-US"/>
           </a:p>
@@ -6022,7 +6128,7 @@
     </p:spTree>
     <p:extLst>
       <p:ext uri="{BB962C8B-B14F-4D97-AF65-F5344CB8AC3E}">
-        <p14:creationId xmlns:p14="http://schemas.microsoft.com/office/powerpoint/2010/main" val="4004898599"/>
+        <p14:creationId xmlns:p14="http://schemas.microsoft.com/office/powerpoint/2010/main" val="3469524703"/>
       </p:ext>
     </p:extLst>
   </p:cSld>
@@ -6078,24 +6184,19 @@
           <a:p>
             <a:r>
               <a:rPr lang="en-US" dirty="0"/>
-              <a:t>So here’s a possible representation of a tax bracket.   Note the comment on the first two lines, which tells us what a value of type </a:t>
-            </a:r>
-            <a:r>
-              <a:rPr lang="en-US" dirty="0" err="1"/>
-              <a:t>TaxBracket</a:t>
-            </a:r>
+              <a:t>&lt;You can skip this example if you are worried about time&gt;</a:t>
+            </a:r>
+          </a:p>
+          <a:p>
             <a:r>
               <a:rPr lang="en-US" dirty="0"/>
-              <a:t> means in the real world.</a:t>
-            </a:r>
-          </a:p>
-          <a:p>
-            <a:endParaRPr lang="en-US" dirty="0"/>
+              <a:t>Here’s another example:</a:t>
+            </a:r>
           </a:p>
           <a:p>
             <a:r>
               <a:rPr lang="en-US" dirty="0"/>
-              <a:t>Among other things, we now have a single point of control if we ever need to change the brackets.</a:t>
+              <a:t>&lt;read slide&gt;</a:t>
             </a:r>
           </a:p>
         </p:txBody>
@@ -6117,7 +6218,7 @@
           <a:p>
             <a:fld id="{07937F07-1250-4CCE-B198-1B2887014F41}" type="slidenum">
               <a:rPr lang="en-US" smtClean="0"/>
-              <a:t>26</a:t>
+              <a:t>24</a:t>
             </a:fld>
             <a:endParaRPr lang="en-US"/>
           </a:p>
@@ -6126,7 +6227,7 @@
     </p:spTree>
     <p:extLst>
       <p:ext uri="{BB962C8B-B14F-4D97-AF65-F5344CB8AC3E}">
-        <p14:creationId xmlns:p14="http://schemas.microsoft.com/office/powerpoint/2010/main" val="2553356460"/>
+        <p14:creationId xmlns:p14="http://schemas.microsoft.com/office/powerpoint/2010/main" val="1751579969"/>
       </p:ext>
     </p:extLst>
   </p:cSld>
@@ -6182,7 +6283,7 @@
           <a:p>
             <a:r>
               <a:rPr lang="en-US" dirty="0"/>
-              <a:t>So here’s our rewritten code.  And we are back to one function/one job.</a:t>
+              <a:t>Here’s a possible piece of code.  </a:t>
             </a:r>
           </a:p>
           <a:p>
@@ -6190,8 +6291,34 @@
           </a:p>
           <a:p>
             <a:r>
+              <a:rPr lang="en-US" dirty="0">
+                <a:solidFill>
+                  <a:schemeClr val="tx1"/>
+                </a:solidFill>
+              </a:rPr>
+              <a:t>Here we’ve hard-coded the information about the tax brackets.</a:t>
+            </a:r>
+          </a:p>
+          <a:p>
+            <a:r>
+              <a:rPr lang="en-US" dirty="0">
+                <a:solidFill>
+                  <a:schemeClr val="tx1"/>
+                </a:solidFill>
+              </a:rPr>
+              <a:t>But those might certainly change.  What might change?</a:t>
+            </a:r>
+          </a:p>
+          <a:p>
+            <a:r>
               <a:rPr lang="en-US" dirty="0"/>
-              <a:t>Professor Wand says: “True story: My first draft of this code was quite different and had several bugs.  I eventually located the bugs by rewriting the code with one function/one job.   When I did that, it was easy to see which part was broken.”</a:t>
+              <a:t>The boundaries of the tax brackets might change </a:t>
+            </a:r>
+          </a:p>
+          <a:p>
+            <a:r>
+              <a:rPr lang="en-US" dirty="0"/>
+              <a:t>The number of brackets might change.   </a:t>
             </a:r>
           </a:p>
           <a:p>
@@ -6200,40 +6327,47 @@
           <a:p>
             <a:r>
               <a:rPr lang="en-US" dirty="0"/>
-              <a:t>What assumptions does </a:t>
-            </a:r>
-            <a:r>
-              <a:rPr lang="en-US" b="1" dirty="0"/>
-              <a:t>income2bracket</a:t>
-            </a:r>
+              <a:t>This tells us that the notion of a “tax bracket” is an important concept.</a:t>
+            </a:r>
+          </a:p>
+          <a:p>
+            <a:endParaRPr lang="en-US" dirty="0"/>
+          </a:p>
+          <a:p>
             <a:r>
               <a:rPr lang="en-US" dirty="0"/>
-              <a:t> make about the list </a:t>
-            </a:r>
-            <a:r>
-              <a:rPr lang="en-US" b="1" dirty="0"/>
-              <a:t>brackets</a:t>
-            </a:r>
+              <a:t>But this concept is not explicit in the code we’re looking at– it’s hard-wired into the code.</a:t>
+            </a:r>
+          </a:p>
+          <a:p>
+            <a:endParaRPr lang="en-US" dirty="0"/>
+          </a:p>
+          <a:p>
             <a:r>
               <a:rPr lang="en-US" dirty="0"/>
-              <a:t>?</a:t>
-            </a:r>
-            <a:r>
-              <a:rPr lang="en-US" b="1" dirty="0"/>
-              <a:t>  </a:t>
-            </a:r>
-            <a:r>
-              <a:rPr lang="en-US" b="0" dirty="0"/>
-              <a:t>Hint: how could you define a bracket list that would break income2bracket?  Where should we record these assumptions? Would it help to define a type called </a:t>
-            </a:r>
-            <a:r>
-              <a:rPr lang="en-US" b="0" dirty="0" err="1"/>
-              <a:t>TaxBracketList</a:t>
-            </a:r>
-            <a:r>
-              <a:rPr lang="en-US" b="0" dirty="0"/>
-              <a:t> ?</a:t>
-            </a:r>
+              <a:t>So probably we should have a representation of “a tax bracket” as a piece of data.</a:t>
+            </a:r>
+          </a:p>
+          <a:p>
+            <a:endParaRPr lang="en-US" dirty="0"/>
+          </a:p>
+          <a:p>
+            <a:r>
+              <a:rPr lang="en-US" dirty="0"/>
+              <a:t>And once we realize that “tax bracket” is an important concept, we can  also see that this piece of code violates One Function/One Job:</a:t>
+            </a:r>
+          </a:p>
+          <a:p>
+            <a:r>
+              <a:rPr lang="en-US" dirty="0"/>
+              <a:t>It finds the appropriate bracket AND calculates the appropriate tax.</a:t>
+            </a:r>
+          </a:p>
+          <a:p>
+            <a:pPr lvl="1"/>
+            <a:endParaRPr lang="en-US" dirty="0"/>
+          </a:p>
+          <a:p>
             <a:endParaRPr lang="en-US" dirty="0"/>
           </a:p>
         </p:txBody>
@@ -6255,7 +6389,7 @@
           <a:p>
             <a:fld id="{07937F07-1250-4CCE-B198-1B2887014F41}" type="slidenum">
               <a:rPr lang="en-US" smtClean="0"/>
-              <a:t>27</a:t>
+              <a:t>25</a:t>
             </a:fld>
             <a:endParaRPr lang="en-US"/>
           </a:p>
@@ -6264,7 +6398,7 @@
     </p:spTree>
     <p:extLst>
       <p:ext uri="{BB962C8B-B14F-4D97-AF65-F5344CB8AC3E}">
-        <p14:creationId xmlns:p14="http://schemas.microsoft.com/office/powerpoint/2010/main" val="2253570917"/>
+        <p14:creationId xmlns:p14="http://schemas.microsoft.com/office/powerpoint/2010/main" val="4004898599"/>
       </p:ext>
     </p:extLst>
   </p:cSld>
@@ -6320,19 +6454,24 @@
           <a:p>
             <a:r>
               <a:rPr lang="en-US" dirty="0"/>
-              <a:t>&lt;Cover if time&gt; </a:t>
-            </a:r>
-          </a:p>
-          <a:p>
+              <a:t>So here’s a possible representation of a tax bracket.   Note the comment on the first two lines, which tells us what a value of type </a:t>
+            </a:r>
+            <a:r>
+              <a:rPr lang="en-US" dirty="0" err="1"/>
+              <a:t>TaxBracket</a:t>
+            </a:r>
             <a:r>
               <a:rPr lang="en-US" dirty="0"/>
-              <a:t>This lesson has been about design at the code level.   Here’s some brief introduction to the other two scales. </a:t>
-            </a:r>
+              <a:t> means in the real world.</a:t>
+            </a:r>
+          </a:p>
+          <a:p>
+            <a:endParaRPr lang="en-US" dirty="0"/>
           </a:p>
           <a:p>
             <a:r>
               <a:rPr lang="en-US" dirty="0"/>
-              <a:t>&lt;read slide&gt;</a:t>
+              <a:t>Among other things, we now have a single point of control if we ever need to change the brackets.</a:t>
             </a:r>
           </a:p>
         </p:txBody>
@@ -6354,7 +6493,7 @@
           <a:p>
             <a:fld id="{07937F07-1250-4CCE-B198-1B2887014F41}" type="slidenum">
               <a:rPr lang="en-US" smtClean="0"/>
-              <a:t>30</a:t>
+              <a:t>26</a:t>
             </a:fld>
             <a:endParaRPr lang="en-US"/>
           </a:p>
@@ -6363,7 +6502,7 @@
     </p:spTree>
     <p:extLst>
       <p:ext uri="{BB962C8B-B14F-4D97-AF65-F5344CB8AC3E}">
-        <p14:creationId xmlns:p14="http://schemas.microsoft.com/office/powerpoint/2010/main" val="3015819319"/>
+        <p14:creationId xmlns:p14="http://schemas.microsoft.com/office/powerpoint/2010/main" val="2553356460"/>
       </p:ext>
     </p:extLst>
   </p:cSld>
@@ -6419,7 +6558,7 @@
           <a:p>
             <a:r>
               <a:rPr lang="en-US" dirty="0"/>
-              <a:t>Our first architectural style is the object-oriented architecture.  In this architecture, the pieces of the program correspond to entities in the real world, and the properties and operations correspond to properties and operations of the corresponding real-world objects.</a:t>
+              <a:t>So here’s our rewritten code.  And we are back to one function/one job.</a:t>
             </a:r>
           </a:p>
           <a:p>
@@ -6428,7 +6567,7 @@
           <a:p>
             <a:r>
               <a:rPr lang="en-US" dirty="0"/>
-              <a:t>For example, in a library catalog system, we might have…&lt;read slide&gt;.</a:t>
+              <a:t>Professor Wand says: “True story: My first draft of this code was quite different and had several bugs.  I eventually located the bugs by rewriting the code with one function/one job.   When I did that, it was easy to see which part was broken.”</a:t>
             </a:r>
           </a:p>
           <a:p>
@@ -6437,8 +6576,41 @@
           <a:p>
             <a:r>
               <a:rPr lang="en-US" dirty="0"/>
-              <a:t>This is not about the language technology that we use to implement the system.  We could conceivably implement an object-oriented architecture using a language that was not itself object-oriented.</a:t>
-            </a:r>
+              <a:t>What assumptions does </a:t>
+            </a:r>
+            <a:r>
+              <a:rPr lang="en-US" b="1" dirty="0"/>
+              <a:t>income2bracket</a:t>
+            </a:r>
+            <a:r>
+              <a:rPr lang="en-US" dirty="0"/>
+              <a:t> make about the list </a:t>
+            </a:r>
+            <a:r>
+              <a:rPr lang="en-US" b="1" dirty="0"/>
+              <a:t>brackets</a:t>
+            </a:r>
+            <a:r>
+              <a:rPr lang="en-US" dirty="0"/>
+              <a:t>?</a:t>
+            </a:r>
+            <a:r>
+              <a:rPr lang="en-US" b="1" dirty="0"/>
+              <a:t>  </a:t>
+            </a:r>
+            <a:r>
+              <a:rPr lang="en-US" b="0" dirty="0"/>
+              <a:t>Hint: how could you define a bracket list that would break income2bracket?  Where should we record these assumptions? Would it help to define a type called </a:t>
+            </a:r>
+            <a:r>
+              <a:rPr lang="en-US" b="0" dirty="0" err="1"/>
+              <a:t>TaxBracketList</a:t>
+            </a:r>
+            <a:r>
+              <a:rPr lang="en-US" b="0" dirty="0"/>
+              <a:t> ?</a:t>
+            </a:r>
+            <a:endParaRPr lang="en-US" dirty="0"/>
           </a:p>
         </p:txBody>
       </p:sp>
@@ -6459,7 +6631,7 @@
           <a:p>
             <a:fld id="{07937F07-1250-4CCE-B198-1B2887014F41}" type="slidenum">
               <a:rPr lang="en-US" smtClean="0"/>
-              <a:t>31</a:t>
+              <a:t>27</a:t>
             </a:fld>
             <a:endParaRPr lang="en-US"/>
           </a:p>
@@ -6468,7 +6640,7 @@
     </p:spTree>
     <p:extLst>
       <p:ext uri="{BB962C8B-B14F-4D97-AF65-F5344CB8AC3E}">
-        <p14:creationId xmlns:p14="http://schemas.microsoft.com/office/powerpoint/2010/main" val="2875258308"/>
+        <p14:creationId xmlns:p14="http://schemas.microsoft.com/office/powerpoint/2010/main" val="2253570917"/>
       </p:ext>
     </p:extLst>
   </p:cSld>
@@ -6524,7 +6696,82 @@
           <a:p>
             <a:r>
               <a:rPr lang="en-US" dirty="0"/>
-              <a:t>Pipelines are a third kind of architecture.  Here, the pieces correspond to steps in the transformation of some data.  Each piece depends on the data produced by the preceding piece.</a:t>
+              <a:t>&lt;Cover if time&gt; </a:t>
+            </a:r>
+          </a:p>
+          <a:p>
+            <a:r>
+              <a:rPr lang="en-US" dirty="0"/>
+              <a:t>This lesson has been about design at the code level.   Here’s some brief introduction to the other two scales, starting with top level, also sometimes called Architecture level. </a:t>
+            </a:r>
+          </a:p>
+          <a:p>
+            <a:r>
+              <a:rPr lang="en-US" dirty="0"/>
+              <a:t>&lt;read slide&gt;</a:t>
+            </a:r>
+          </a:p>
+          <a:p>
+            <a:pPr marL="0" marR="0" lvl="0" indent="0" algn="l" defTabSz="914400" rtl="0" eaLnBrk="1" fontAlgn="auto" latinLnBrk="0" hangingPunct="1">
+              <a:lnSpc>
+                <a:spcPct val="100000"/>
+              </a:lnSpc>
+              <a:spcBef>
+                <a:spcPts val="0"/>
+              </a:spcBef>
+              <a:spcAft>
+                <a:spcPts val="0"/>
+              </a:spcAft>
+              <a:buClrTx/>
+              <a:buSzTx/>
+              <a:buFontTx/>
+              <a:buNone/>
+              <a:tabLst/>
+              <a:defRPr/>
+            </a:pPr>
+            <a:r>
+              <a:rPr lang="en-US" dirty="0"/>
+              <a:t>Although we will cover just a few, there are many more: like Plug-in architecture (</a:t>
+            </a:r>
+            <a:r>
+              <a:rPr lang="en-US" dirty="0" err="1"/>
+              <a:t>firefox</a:t>
+            </a:r>
+            <a:r>
+              <a:rPr lang="en-US" dirty="0"/>
+              <a:t>, </a:t>
+            </a:r>
+            <a:r>
+              <a:rPr lang="en-US" dirty="0" err="1"/>
+              <a:t>vsc</a:t>
+            </a:r>
+            <a:r>
+              <a:rPr lang="en-US" dirty="0"/>
+              <a:t>), event-driven architectures (android, </a:t>
+            </a:r>
+            <a:r>
+              <a:rPr lang="en-US" dirty="0" err="1"/>
+              <a:t>mobileOS</a:t>
+            </a:r>
+            <a:r>
+              <a:rPr lang="en-US" dirty="0"/>
+              <a:t>), P2P (</a:t>
+            </a:r>
+            <a:r>
+              <a:rPr lang="en-US" dirty="0" err="1"/>
+              <a:t>Zelle</a:t>
+            </a:r>
+            <a:r>
+              <a:rPr lang="en-US" dirty="0"/>
+              <a:t>, </a:t>
+            </a:r>
+            <a:r>
+              <a:rPr lang="en-US" dirty="0" err="1"/>
+              <a:t>bitTorrent</a:t>
+            </a:r>
+            <a:r>
+              <a:rPr lang="en-US" dirty="0"/>
+              <a:t>), Microservices (Firefox). Many modern large scale systems are now heterogeneous (i.e., combination of many)</a:t>
             </a:r>
           </a:p>
         </p:txBody>
@@ -6546,7 +6793,7 @@
           <a:p>
             <a:fld id="{07937F07-1250-4CCE-B198-1B2887014F41}" type="slidenum">
               <a:rPr lang="en-US" smtClean="0"/>
-              <a:t>32</a:t>
+              <a:t>30</a:t>
             </a:fld>
             <a:endParaRPr lang="en-US"/>
           </a:p>
@@ -6555,7 +6802,7 @@
     </p:spTree>
     <p:extLst>
       <p:ext uri="{BB962C8B-B14F-4D97-AF65-F5344CB8AC3E}">
-        <p14:creationId xmlns:p14="http://schemas.microsoft.com/office/powerpoint/2010/main" val="266470020"/>
+        <p14:creationId xmlns:p14="http://schemas.microsoft.com/office/powerpoint/2010/main" val="3015819319"/>
       </p:ext>
     </p:extLst>
   </p:cSld>
@@ -6611,7 +6858,25 @@
           <a:p>
             <a:r>
               <a:rPr lang="en-US" dirty="0"/>
-              <a:t>Pipelines are a third kind of architecture.  Here, the pieces correspond to steps in the transformation of some data.  Each piece depends on the data produced by the preceding piece.</a:t>
+              <a:t>Our first architectural style is the object-oriented architecture.  In this architecture, the pieces of the program correspond to entities in the real world, and the properties and operations correspond to properties and operations of the corresponding real-world objects.</a:t>
+            </a:r>
+          </a:p>
+          <a:p>
+            <a:endParaRPr lang="en-US" dirty="0"/>
+          </a:p>
+          <a:p>
+            <a:r>
+              <a:rPr lang="en-US" dirty="0"/>
+              <a:t>For example, in a library catalog system, we might have…&lt;read slide&gt;.</a:t>
+            </a:r>
+          </a:p>
+          <a:p>
+            <a:endParaRPr lang="en-US" dirty="0"/>
+          </a:p>
+          <a:p>
+            <a:r>
+              <a:rPr lang="en-US" dirty="0"/>
+              <a:t>This is not about the language technology that we use to implement the system.  We could conceivably implement an object-oriented architecture using a language that was not itself object-oriented.</a:t>
             </a:r>
           </a:p>
         </p:txBody>
@@ -6633,7 +6898,7 @@
           <a:p>
             <a:fld id="{07937F07-1250-4CCE-B198-1B2887014F41}" type="slidenum">
               <a:rPr lang="en-US" smtClean="0"/>
-              <a:t>33</a:t>
+              <a:t>31</a:t>
             </a:fld>
             <a:endParaRPr lang="en-US"/>
           </a:p>
@@ -6642,7 +6907,7 @@
     </p:spTree>
     <p:extLst>
       <p:ext uri="{BB962C8B-B14F-4D97-AF65-F5344CB8AC3E}">
-        <p14:creationId xmlns:p14="http://schemas.microsoft.com/office/powerpoint/2010/main" val="3485627478"/>
+        <p14:creationId xmlns:p14="http://schemas.microsoft.com/office/powerpoint/2010/main" val="2875258308"/>
       </p:ext>
     </p:extLst>
   </p:cSld>
@@ -6698,25 +6963,7 @@
           <a:p>
             <a:r>
               <a:rPr lang="en-US" dirty="0"/>
-              <a:t>Here is a layered architecture.  In a layered architecture, the pieces correspond to levels of concern, where each layer depends on services from the layer or layers below.   This is an example of “Separation of Concerns.”   For example, the Presentation Layer depends only on the data supplied by the Business Layer; it does not have to concern itself with the details of how that data is computed.</a:t>
-            </a:r>
-          </a:p>
-          <a:p>
-            <a:endParaRPr lang="en-US" dirty="0"/>
-          </a:p>
-          <a:p>
-            <a:r>
-              <a:rPr lang="en-US" dirty="0"/>
-              <a:t>One advantage of this architecture is that the different layers typically require different areas of expertise, so in a large project one might have separate teams for each layer.</a:t>
-            </a:r>
-          </a:p>
-          <a:p>
-            <a:endParaRPr lang="en-US" dirty="0"/>
-          </a:p>
-          <a:p>
-            <a:r>
-              <a:rPr lang="en-US" dirty="0"/>
-              <a:t>Remember that each Layer may have its own internal architecture.  For example, the Presentation Layer may itself be implemented using an object-oriented architecture.</a:t>
+              <a:t>Pipelines are a third kind of architecture.  Here, the pieces correspond to steps in the transformation of some data.  Each piece depends on the data produced by the preceding piece.</a:t>
             </a:r>
           </a:p>
         </p:txBody>
@@ -6738,7 +6985,7 @@
           <a:p>
             <a:fld id="{07937F07-1250-4CCE-B198-1B2887014F41}" type="slidenum">
               <a:rPr lang="en-US" smtClean="0"/>
-              <a:t>34</a:t>
+              <a:t>32</a:t>
             </a:fld>
             <a:endParaRPr lang="en-US"/>
           </a:p>
@@ -6747,7 +6994,7 @@
     </p:spTree>
     <p:extLst>
       <p:ext uri="{BB962C8B-B14F-4D97-AF65-F5344CB8AC3E}">
-        <p14:creationId xmlns:p14="http://schemas.microsoft.com/office/powerpoint/2010/main" val="1470197955"/>
+        <p14:creationId xmlns:p14="http://schemas.microsoft.com/office/powerpoint/2010/main" val="266470020"/>
       </p:ext>
     </p:extLst>
   </p:cSld>
@@ -6803,7 +7050,13 @@
           <a:p>
             <a:r>
               <a:rPr lang="en-US" dirty="0"/>
-              <a:t>&lt;Read Slide&gt;</a:t>
+              <a:t>To put this in context, Design is the SE activity before coding. There is a saying in SE that goes like this: “Design is not coding, coding is not design”. Design is a critical part of your SE process.</a:t>
+            </a:r>
+          </a:p>
+          <a:p>
+            <a:r>
+              <a:rPr lang="en-US" dirty="0"/>
+              <a:t>&lt;Read slide&gt;</a:t>
             </a:r>
           </a:p>
         </p:txBody>
@@ -6825,7 +7078,7 @@
           <a:p>
             <a:fld id="{07937F07-1250-4CCE-B198-1B2887014F41}" type="slidenum">
               <a:rPr lang="en-US" smtClean="0"/>
-              <a:t>4</a:t>
+              <a:t>3</a:t>
             </a:fld>
             <a:endParaRPr lang="en-US"/>
           </a:p>
@@ -6834,7 +7087,7 @@
     </p:spTree>
     <p:extLst>
       <p:ext uri="{BB962C8B-B14F-4D97-AF65-F5344CB8AC3E}">
-        <p14:creationId xmlns:p14="http://schemas.microsoft.com/office/powerpoint/2010/main" val="3816831229"/>
+        <p14:creationId xmlns:p14="http://schemas.microsoft.com/office/powerpoint/2010/main" val="1000117384"/>
       </p:ext>
     </p:extLst>
   </p:cSld>
@@ -6845,6 +7098,198 @@
 </file>
 
 <file path=ppt/notesSlides/notesSlide30.xml><?xml version="1.0" encoding="utf-8"?>
+<p:notes xmlns:a="http://schemas.openxmlformats.org/drawingml/2006/main" xmlns:r="http://schemas.openxmlformats.org/officeDocument/2006/relationships" xmlns:p="http://schemas.openxmlformats.org/presentationml/2006/main">
+  <p:cSld>
+    <p:spTree>
+      <p:nvGrpSpPr>
+        <p:cNvPr id="1" name=""/>
+        <p:cNvGrpSpPr/>
+        <p:nvPr/>
+      </p:nvGrpSpPr>
+      <p:grpSpPr>
+        <a:xfrm>
+          <a:off x="0" y="0"/>
+          <a:ext cx="0" cy="0"/>
+          <a:chOff x="0" y="0"/>
+          <a:chExt cx="0" cy="0"/>
+        </a:xfrm>
+      </p:grpSpPr>
+      <p:sp>
+        <p:nvSpPr>
+          <p:cNvPr id="2" name="Slide Image Placeholder 1"/>
+          <p:cNvSpPr>
+            <a:spLocks noGrp="1" noRot="1" noChangeAspect="1"/>
+          </p:cNvSpPr>
+          <p:nvPr>
+            <p:ph type="sldImg"/>
+          </p:nvPr>
+        </p:nvSpPr>
+        <p:spPr/>
+      </p:sp>
+      <p:sp>
+        <p:nvSpPr>
+          <p:cNvPr id="3" name="Notes Placeholder 2"/>
+          <p:cNvSpPr>
+            <a:spLocks noGrp="1"/>
+          </p:cNvSpPr>
+          <p:nvPr>
+            <p:ph type="body" idx="1"/>
+          </p:nvPr>
+        </p:nvSpPr>
+        <p:spPr/>
+        <p:txBody>
+          <a:bodyPr/>
+          <a:lstStyle/>
+          <a:p>
+            <a:r>
+              <a:rPr lang="en-US" dirty="0"/>
+              <a:t>Pipelines are a third kind of architecture.  Here, the pieces correspond to steps in the transformation of some data.  Each piece depends on the data produced by the preceding piece.</a:t>
+            </a:r>
+          </a:p>
+        </p:txBody>
+      </p:sp>
+      <p:sp>
+        <p:nvSpPr>
+          <p:cNvPr id="4" name="Slide Number Placeholder 3"/>
+          <p:cNvSpPr>
+            <a:spLocks noGrp="1"/>
+          </p:cNvSpPr>
+          <p:nvPr>
+            <p:ph type="sldNum" sz="quarter" idx="5"/>
+          </p:nvPr>
+        </p:nvSpPr>
+        <p:spPr/>
+        <p:txBody>
+          <a:bodyPr/>
+          <a:lstStyle/>
+          <a:p>
+            <a:fld id="{07937F07-1250-4CCE-B198-1B2887014F41}" type="slidenum">
+              <a:rPr lang="en-US" smtClean="0"/>
+              <a:t>33</a:t>
+            </a:fld>
+            <a:endParaRPr lang="en-US"/>
+          </a:p>
+        </p:txBody>
+      </p:sp>
+    </p:spTree>
+    <p:extLst>
+      <p:ext uri="{BB962C8B-B14F-4D97-AF65-F5344CB8AC3E}">
+        <p14:creationId xmlns:p14="http://schemas.microsoft.com/office/powerpoint/2010/main" val="3485627478"/>
+      </p:ext>
+    </p:extLst>
+  </p:cSld>
+  <p:clrMapOvr>
+    <a:masterClrMapping/>
+  </p:clrMapOvr>
+</p:notes>
+</file>
+
+<file path=ppt/notesSlides/notesSlide31.xml><?xml version="1.0" encoding="utf-8"?>
+<p:notes xmlns:a="http://schemas.openxmlformats.org/drawingml/2006/main" xmlns:r="http://schemas.openxmlformats.org/officeDocument/2006/relationships" xmlns:p="http://schemas.openxmlformats.org/presentationml/2006/main">
+  <p:cSld>
+    <p:spTree>
+      <p:nvGrpSpPr>
+        <p:cNvPr id="1" name=""/>
+        <p:cNvGrpSpPr/>
+        <p:nvPr/>
+      </p:nvGrpSpPr>
+      <p:grpSpPr>
+        <a:xfrm>
+          <a:off x="0" y="0"/>
+          <a:ext cx="0" cy="0"/>
+          <a:chOff x="0" y="0"/>
+          <a:chExt cx="0" cy="0"/>
+        </a:xfrm>
+      </p:grpSpPr>
+      <p:sp>
+        <p:nvSpPr>
+          <p:cNvPr id="2" name="Slide Image Placeholder 1"/>
+          <p:cNvSpPr>
+            <a:spLocks noGrp="1" noRot="1" noChangeAspect="1"/>
+          </p:cNvSpPr>
+          <p:nvPr>
+            <p:ph type="sldImg"/>
+          </p:nvPr>
+        </p:nvSpPr>
+        <p:spPr/>
+      </p:sp>
+      <p:sp>
+        <p:nvSpPr>
+          <p:cNvPr id="3" name="Notes Placeholder 2"/>
+          <p:cNvSpPr>
+            <a:spLocks noGrp="1"/>
+          </p:cNvSpPr>
+          <p:nvPr>
+            <p:ph type="body" idx="1"/>
+          </p:nvPr>
+        </p:nvSpPr>
+        <p:spPr/>
+        <p:txBody>
+          <a:bodyPr/>
+          <a:lstStyle/>
+          <a:p>
+            <a:r>
+              <a:rPr lang="en-US" dirty="0"/>
+              <a:t>Here is a layered architecture.  In a layered architecture, the pieces correspond to levels of concern, where each layer depends on services from the layer or layers below.   This is an example of “Separation of Concerns.”   For example, the Presentation Layer depends only on the data supplied by the Business Layer; it does not have to concern itself with the details of how that data is computed.</a:t>
+            </a:r>
+          </a:p>
+          <a:p>
+            <a:endParaRPr lang="en-US" dirty="0"/>
+          </a:p>
+          <a:p>
+            <a:r>
+              <a:rPr lang="en-US" dirty="0"/>
+              <a:t>One advantage of this architecture is that the different layers typically require different areas of expertise, so in a large project one might have separate teams for each layer.</a:t>
+            </a:r>
+          </a:p>
+          <a:p>
+            <a:endParaRPr lang="en-US" dirty="0"/>
+          </a:p>
+          <a:p>
+            <a:r>
+              <a:rPr lang="en-US" dirty="0"/>
+              <a:t>Remember that each Layer may have its own internal architecture.  For example, the Presentation Layer may itself be implemented using an object-oriented architecture.</a:t>
+            </a:r>
+          </a:p>
+        </p:txBody>
+      </p:sp>
+      <p:sp>
+        <p:nvSpPr>
+          <p:cNvPr id="4" name="Slide Number Placeholder 3"/>
+          <p:cNvSpPr>
+            <a:spLocks noGrp="1"/>
+          </p:cNvSpPr>
+          <p:nvPr>
+            <p:ph type="sldNum" sz="quarter" idx="5"/>
+          </p:nvPr>
+        </p:nvSpPr>
+        <p:spPr/>
+        <p:txBody>
+          <a:bodyPr/>
+          <a:lstStyle/>
+          <a:p>
+            <a:fld id="{07937F07-1250-4CCE-B198-1B2887014F41}" type="slidenum">
+              <a:rPr lang="en-US" smtClean="0"/>
+              <a:t>34</a:t>
+            </a:fld>
+            <a:endParaRPr lang="en-US"/>
+          </a:p>
+        </p:txBody>
+      </p:sp>
+    </p:spTree>
+    <p:extLst>
+      <p:ext uri="{BB962C8B-B14F-4D97-AF65-F5344CB8AC3E}">
+        <p14:creationId xmlns:p14="http://schemas.microsoft.com/office/powerpoint/2010/main" val="1470197955"/>
+      </p:ext>
+    </p:extLst>
+  </p:cSld>
+  <p:clrMapOvr>
+    <a:masterClrMapping/>
+  </p:clrMapOvr>
+</p:notes>
+</file>
+
+<file path=ppt/notesSlides/notesSlide32.xml><?xml version="1.0" encoding="utf-8"?>
 <p:notes xmlns:a="http://schemas.openxmlformats.org/drawingml/2006/main" xmlns:r="http://schemas.openxmlformats.org/officeDocument/2006/relationships" xmlns:p="http://schemas.openxmlformats.org/presentationml/2006/main">
   <p:cSld>
     <p:spTree>
@@ -6977,8 +7422,18 @@
           <a:p>
             <a:r>
               <a:rPr lang="en-US" dirty="0"/>
-              <a:t>&lt;Read slide&gt;</a:t>
-            </a:r>
+              <a:t>&lt;Read Slide&gt;</a:t>
+            </a:r>
+          </a:p>
+          <a:p>
+            <a:r>
+              <a:rPr lang="en-US" dirty="0"/>
+              <a:t>A relevant question here often is, what are qualities of a good design? Mitch Kapor (Lotus123) says that “good design must exhibit firmness, commodity and delight.</a:t>
+            </a:r>
+            <a:br>
+              <a:rPr lang="en-US" dirty="0"/>
+            </a:br>
+            <a:endParaRPr lang="en-US" dirty="0"/>
           </a:p>
         </p:txBody>
       </p:sp>
@@ -6999,7 +7454,7 @@
           <a:p>
             <a:fld id="{07937F07-1250-4CCE-B198-1B2887014F41}" type="slidenum">
               <a:rPr lang="en-US" smtClean="0"/>
-              <a:t>7</a:t>
+              <a:t>4</a:t>
             </a:fld>
             <a:endParaRPr lang="en-US"/>
           </a:p>
@@ -7008,7 +7463,7 @@
     </p:spTree>
     <p:extLst>
       <p:ext uri="{BB962C8B-B14F-4D97-AF65-F5344CB8AC3E}">
-        <p14:creationId xmlns:p14="http://schemas.microsoft.com/office/powerpoint/2010/main" val="805651060"/>
+        <p14:creationId xmlns:p14="http://schemas.microsoft.com/office/powerpoint/2010/main" val="3816831229"/>
       </p:ext>
     </p:extLst>
   </p:cSld>
@@ -7062,98 +7517,20 @@
           <a:bodyPr/>
           <a:lstStyle/>
           <a:p>
-            <a:pPr marL="0" marR="0" lvl="0" indent="0" algn="l" defTabSz="914400" rtl="0" eaLnBrk="1" fontAlgn="auto" latinLnBrk="0" hangingPunct="1">
-              <a:lnSpc>
-                <a:spcPct val="100000"/>
-              </a:lnSpc>
-              <a:spcBef>
-                <a:spcPts val="0"/>
-              </a:spcBef>
-              <a:spcAft>
-                <a:spcPts val="0"/>
-              </a:spcAft>
-              <a:buClrTx/>
-              <a:buSzTx/>
-              <a:buFontTx/>
-              <a:buNone/>
-              <a:tabLst/>
-              <a:defRPr/>
-            </a:pPr>
-            <a:r>
-              <a:rPr lang="en-US" sz="1200" dirty="0">
-                <a:solidFill>
-                  <a:schemeClr val="tx1"/>
-                </a:solidFill>
-              </a:rPr>
-              <a:t>Here are five general-purpose principles that apply to just about all programming tasks.  We’ve phrased this in terms of programming practices: things that you can do to make your </a:t>
-            </a:r>
-            <a:r>
-              <a:rPr lang="en-US" sz="1200">
-                <a:solidFill>
-                  <a:schemeClr val="tx1"/>
-                </a:solidFill>
-              </a:rPr>
-              <a:t>code better.</a:t>
-            </a:r>
-            <a:endParaRPr lang="en-US" sz="1200" dirty="0">
-              <a:solidFill>
-                <a:schemeClr val="tx1"/>
-              </a:solidFill>
-            </a:endParaRPr>
-          </a:p>
-          <a:p>
-            <a:pPr marL="0" marR="0" lvl="0" indent="0" algn="l" defTabSz="914400" rtl="0" eaLnBrk="1" fontAlgn="auto" latinLnBrk="0" hangingPunct="1">
-              <a:lnSpc>
-                <a:spcPct val="100000"/>
-              </a:lnSpc>
-              <a:spcBef>
-                <a:spcPts val="0"/>
-              </a:spcBef>
-              <a:spcAft>
-                <a:spcPts val="0"/>
-              </a:spcAft>
-              <a:buClrTx/>
-              <a:buSzTx/>
-              <a:buFontTx/>
-              <a:buNone/>
-              <a:tabLst/>
-              <a:defRPr/>
-            </a:pPr>
-            <a:endParaRPr lang="en-US" sz="1200" dirty="0">
-              <a:solidFill>
-                <a:schemeClr val="tx1"/>
-              </a:solidFill>
-            </a:endParaRPr>
-          </a:p>
-          <a:p>
-            <a:pPr marL="0" marR="0" lvl="0" indent="0" algn="l" defTabSz="914400" rtl="0" eaLnBrk="1" fontAlgn="auto" latinLnBrk="0" hangingPunct="1">
-              <a:lnSpc>
-                <a:spcPct val="100000"/>
-              </a:lnSpc>
-              <a:spcBef>
-                <a:spcPts val="0"/>
-              </a:spcBef>
-              <a:spcAft>
-                <a:spcPts val="0"/>
-              </a:spcAft>
-              <a:buClrTx/>
-              <a:buSzTx/>
-              <a:buFontTx/>
-              <a:buNone/>
-              <a:tabLst/>
-              <a:defRPr/>
-            </a:pPr>
-            <a:r>
-              <a:rPr lang="en-US" sz="1200" dirty="0">
-                <a:solidFill>
-                  <a:schemeClr val="tx1"/>
-                </a:solidFill>
-              </a:rPr>
-              <a:t>I suggest that you make a sticky note with this list and keep it on your laptop screen or somewhere in your workspace so that you will be constantly reminded of it.</a:t>
-            </a:r>
-          </a:p>
-          <a:p>
-            <a:endParaRPr lang="en-US" dirty="0"/>
+            <a:r>
+              <a:rPr lang="en-US" dirty="0"/>
+              <a:t>&lt;Read Slide&gt;</a:t>
+            </a:r>
+          </a:p>
+          <a:p>
+            <a:r>
+              <a:rPr lang="en-US" dirty="0"/>
+              <a:t>Remember that Design is often an </a:t>
+            </a:r>
+            <a:r>
+              <a:rPr lang="en-US"/>
+              <a:t>iterative process.</a:t>
+            </a:r>
           </a:p>
         </p:txBody>
       </p:sp>
@@ -7174,7 +7551,7 @@
           <a:p>
             <a:fld id="{07937F07-1250-4CCE-B198-1B2887014F41}" type="slidenum">
               <a:rPr lang="en-US" smtClean="0"/>
-              <a:t>8</a:t>
+              <a:t>5</a:t>
             </a:fld>
             <a:endParaRPr lang="en-US"/>
           </a:p>
@@ -7183,7 +7560,7 @@
     </p:spTree>
     <p:extLst>
       <p:ext uri="{BB962C8B-B14F-4D97-AF65-F5344CB8AC3E}">
-        <p14:creationId xmlns:p14="http://schemas.microsoft.com/office/powerpoint/2010/main" val="954174894"/>
+        <p14:creationId xmlns:p14="http://schemas.microsoft.com/office/powerpoint/2010/main" val="759054072"/>
       </p:ext>
     </p:extLst>
   </p:cSld>
@@ -7239,7 +7616,7 @@
           <a:p>
             <a:r>
               <a:rPr lang="en-US" dirty="0"/>
-              <a:t>&lt;Read Slide&gt;</a:t>
+              <a:t>&lt;Read slide&gt;</a:t>
             </a:r>
           </a:p>
         </p:txBody>
@@ -7261,7 +7638,7 @@
           <a:p>
             <a:fld id="{07937F07-1250-4CCE-B198-1B2887014F41}" type="slidenum">
               <a:rPr lang="en-US" smtClean="0"/>
-              <a:t>9</a:t>
+              <a:t>7</a:t>
             </a:fld>
             <a:endParaRPr lang="en-US"/>
           </a:p>
@@ -7270,7 +7647,7 @@
     </p:spTree>
     <p:extLst>
       <p:ext uri="{BB962C8B-B14F-4D97-AF65-F5344CB8AC3E}">
-        <p14:creationId xmlns:p14="http://schemas.microsoft.com/office/powerpoint/2010/main" val="2994700484"/>
+        <p14:creationId xmlns:p14="http://schemas.microsoft.com/office/powerpoint/2010/main" val="805651060"/>
       </p:ext>
     </p:extLst>
   </p:cSld>
@@ -7324,64 +7701,128 @@
           <a:bodyPr/>
           <a:lstStyle/>
           <a:p>
-            <a:r>
-              <a:rPr lang="en-US" dirty="0"/>
-              <a:t>What do these variables mean?</a:t>
-            </a:r>
-          </a:p>
-          <a:p>
-            <a:r>
-              <a:rPr lang="en-US" dirty="0"/>
-              <a:t>Better names would give the reader a clue</a:t>
-            </a:r>
-          </a:p>
-          <a:p>
-            <a:r>
-              <a:rPr lang="en-US" dirty="0"/>
-              <a:t>&lt;click&gt;</a:t>
-            </a:r>
-          </a:p>
-          <a:p>
-            <a:r>
-              <a:rPr lang="en-US" dirty="0"/>
-              <a:t>This is a little better.  But does </a:t>
-            </a:r>
-            <a:r>
-              <a:rPr lang="en-US" dirty="0">
+            <a:pPr marL="0" marR="0" lvl="0" indent="0" algn="l" defTabSz="914400" rtl="0" eaLnBrk="1" fontAlgn="auto" latinLnBrk="0" hangingPunct="1">
+              <a:lnSpc>
+                <a:spcPct val="100000"/>
+              </a:lnSpc>
+              <a:spcBef>
+                <a:spcPts val="0"/>
+              </a:spcBef>
+              <a:spcAft>
+                <a:spcPts val="0"/>
+              </a:spcAft>
+              <a:buClrTx/>
+              <a:buSzTx/>
+              <a:buFontTx/>
+              <a:buNone/>
+              <a:tabLst/>
+              <a:defRPr/>
+            </a:pPr>
+            <a:r>
+              <a:rPr lang="en-US" sz="1200" dirty="0">
                 <a:solidFill>
                   <a:schemeClr val="tx1"/>
                 </a:solidFill>
               </a:rPr>
-              <a:t>'temp' mean 'temporary', or 'temperature', or something else?</a:t>
-            </a:r>
-          </a:p>
-          <a:p>
-            <a:r>
-              <a:rPr lang="en-US" dirty="0">
+              <a:t>Here are five general-purpose principles that apply to just about all programming tasks.  We’ve phrased this in terms of programming practices: things that you can do to make your </a:t>
+            </a:r>
+            <a:r>
+              <a:rPr lang="en-US" sz="1200">
                 <a:solidFill>
                   <a:schemeClr val="tx1"/>
                 </a:solidFill>
               </a:rPr>
-              <a:t>&lt;click&gt;</a:t>
-            </a:r>
-          </a:p>
-          <a:p>
-            <a:r>
-              <a:rPr lang="en-US" dirty="0">
+              <a:t>code better.</a:t>
+            </a:r>
+            <a:endParaRPr lang="en-US" sz="1200" dirty="0">
+              <a:solidFill>
+                <a:schemeClr val="tx1"/>
+              </a:solidFill>
+            </a:endParaRPr>
+          </a:p>
+          <a:p>
+            <a:pPr marL="0" marR="0" lvl="0" indent="0" algn="l" defTabSz="914400" rtl="0" eaLnBrk="1" fontAlgn="auto" latinLnBrk="0" hangingPunct="1">
+              <a:lnSpc>
+                <a:spcPct val="100000"/>
+              </a:lnSpc>
+              <a:spcBef>
+                <a:spcPts val="0"/>
+              </a:spcBef>
+              <a:spcAft>
+                <a:spcPts val="0"/>
+              </a:spcAft>
+              <a:buClrTx/>
+              <a:buSzTx/>
+              <a:buFontTx/>
+              <a:buNone/>
+              <a:tabLst/>
+              <a:defRPr/>
+            </a:pPr>
+            <a:endParaRPr lang="en-US" sz="1200" dirty="0">
+              <a:solidFill>
+                <a:schemeClr val="tx1"/>
+              </a:solidFill>
+            </a:endParaRPr>
+          </a:p>
+          <a:p>
+            <a:pPr marL="0" marR="0" lvl="0" indent="0" algn="l" defTabSz="914400" rtl="0" eaLnBrk="1" fontAlgn="auto" latinLnBrk="0" hangingPunct="1">
+              <a:lnSpc>
+                <a:spcPct val="100000"/>
+              </a:lnSpc>
+              <a:spcBef>
+                <a:spcPts val="0"/>
+              </a:spcBef>
+              <a:spcAft>
+                <a:spcPts val="0"/>
+              </a:spcAft>
+              <a:buClrTx/>
+              <a:buSzTx/>
+              <a:buFontTx/>
+              <a:buNone/>
+              <a:tabLst/>
+              <a:defRPr/>
+            </a:pPr>
+            <a:r>
+              <a:rPr lang="en-US" sz="1200" dirty="0">
                 <a:solidFill>
                   <a:schemeClr val="tx1"/>
                 </a:solidFill>
               </a:rPr>
-              <a:t>Better names for the data types would be even better.  We’ll say more about this in a minute, when we get to Principle 2: Make Your Data Mean Something</a:t>
-            </a:r>
+              <a:t>I suggest that you make a sticky note with this list and keep it on your laptop screen or somewhere in your workspace so that you will be constantly reminded of it.</a:t>
+            </a:r>
+          </a:p>
+          <a:p>
             <a:endParaRPr lang="en-US" dirty="0"/>
+          </a:p>
+        </p:txBody>
+      </p:sp>
+      <p:sp>
+        <p:nvSpPr>
+          <p:cNvPr id="4" name="Slide Number Placeholder 3"/>
+          <p:cNvSpPr>
+            <a:spLocks noGrp="1"/>
+          </p:cNvSpPr>
+          <p:nvPr>
+            <p:ph type="sldNum" sz="quarter" idx="5"/>
+          </p:nvPr>
+        </p:nvSpPr>
+        <p:spPr/>
+        <p:txBody>
+          <a:bodyPr/>
+          <a:lstStyle/>
+          <a:p>
+            <a:fld id="{07937F07-1250-4CCE-B198-1B2887014F41}" type="slidenum">
+              <a:rPr lang="en-US" smtClean="0"/>
+              <a:t>8</a:t>
+            </a:fld>
+            <a:endParaRPr lang="en-US"/>
           </a:p>
         </p:txBody>
       </p:sp>
     </p:spTree>
     <p:extLst>
       <p:ext uri="{BB962C8B-B14F-4D97-AF65-F5344CB8AC3E}">
-        <p14:creationId xmlns:p14="http://schemas.microsoft.com/office/powerpoint/2010/main" val="3017960103"/>
+        <p14:creationId xmlns:p14="http://schemas.microsoft.com/office/powerpoint/2010/main" val="954174894"/>
       </p:ext>
     </p:extLst>
   </p:cSld>
@@ -7435,86 +7876,10 @@
           <a:bodyPr/>
           <a:lstStyle/>
           <a:p>
-            <a:pPr marL="0" marR="0" lvl="0" indent="0" algn="l" defTabSz="914400" rtl="0" eaLnBrk="1" fontAlgn="auto" latinLnBrk="0" hangingPunct="1">
-              <a:lnSpc>
-                <a:spcPct val="100000"/>
-              </a:lnSpc>
-              <a:spcBef>
-                <a:spcPts val="0"/>
-              </a:spcBef>
-              <a:spcAft>
-                <a:spcPts val="0"/>
-              </a:spcAft>
-              <a:buClrTx/>
-              <a:buSzTx/>
-              <a:buFontTx/>
-              <a:buNone/>
-              <a:tabLst/>
-              <a:defRPr/>
-            </a:pPr>
-            <a:r>
-              <a:rPr lang="en-US" dirty="0">
-                <a:solidFill>
-                  <a:schemeClr val="tx1"/>
-                </a:solidFill>
-              </a:rPr>
-              <a:t>What are you checking it for? Length? Illegal Syntax? or what?</a:t>
-            </a:r>
-          </a:p>
-          <a:p>
-            <a:pPr marL="0" marR="0" lvl="0" indent="0" algn="l" defTabSz="914400" rtl="0" eaLnBrk="1" fontAlgn="auto" latinLnBrk="0" hangingPunct="1">
-              <a:lnSpc>
-                <a:spcPct val="100000"/>
-              </a:lnSpc>
-              <a:spcBef>
-                <a:spcPts val="0"/>
-              </a:spcBef>
-              <a:spcAft>
-                <a:spcPts val="0"/>
-              </a:spcAft>
-              <a:buClrTx/>
-              <a:buSzTx/>
-              <a:buFontTx/>
-              <a:buNone/>
-              <a:tabLst/>
-              <a:defRPr/>
-            </a:pPr>
-            <a:r>
-              <a:rPr lang="en-US" dirty="0">
-                <a:solidFill>
-                  <a:schemeClr val="tx1"/>
-                </a:solidFill>
-              </a:rPr>
-              <a:t>&lt;click&gt;</a:t>
-            </a:r>
-          </a:p>
-          <a:p>
-            <a:pPr marL="0" marR="0" lvl="0" indent="0" algn="l" defTabSz="914400" rtl="0" eaLnBrk="1" fontAlgn="auto" latinLnBrk="0" hangingPunct="1">
-              <a:lnSpc>
-                <a:spcPct val="100000"/>
-              </a:lnSpc>
-              <a:spcBef>
-                <a:spcPts val="0"/>
-              </a:spcBef>
-              <a:spcAft>
-                <a:spcPts val="0"/>
-              </a:spcAft>
-              <a:buClrTx/>
-              <a:buSzTx/>
-              <a:buFontTx/>
-              <a:buNone/>
-              <a:tabLst/>
-              <a:defRPr/>
-            </a:pPr>
-            <a:r>
-              <a:rPr lang="en-US" dirty="0">
-                <a:solidFill>
-                  <a:schemeClr val="tx1"/>
-                </a:solidFill>
-              </a:rPr>
-              <a:t>Ahh, now we know!  </a:t>
-            </a:r>
-            <a:endParaRPr lang="en-US" dirty="0"/>
+            <a:r>
+              <a:rPr lang="en-US" dirty="0"/>
+              <a:t>&lt;Read Slide&gt;</a:t>
+            </a:r>
           </a:p>
         </p:txBody>
       </p:sp>
@@ -7535,7 +7900,7 @@
           <a:p>
             <a:fld id="{07937F07-1250-4CCE-B198-1B2887014F41}" type="slidenum">
               <a:rPr lang="en-US" smtClean="0"/>
-              <a:t>11</a:t>
+              <a:t>9</a:t>
             </a:fld>
             <a:endParaRPr lang="en-US"/>
           </a:p>
@@ -7544,7 +7909,7 @@
     </p:spTree>
     <p:extLst>
       <p:ext uri="{BB962C8B-B14F-4D97-AF65-F5344CB8AC3E}">
-        <p14:creationId xmlns:p14="http://schemas.microsoft.com/office/powerpoint/2010/main" val="3311314528"/>
+        <p14:creationId xmlns:p14="http://schemas.microsoft.com/office/powerpoint/2010/main" val="2994700484"/>
       </p:ext>
     </p:extLst>
   </p:cSld>
@@ -7598,166 +7963,64 @@
           <a:bodyPr/>
           <a:lstStyle/>
           <a:p>
-            <a:pPr marL="0" marR="0" lvl="0" indent="0" algn="l" defTabSz="914400" rtl="0" eaLnBrk="1" fontAlgn="auto" latinLnBrk="0" hangingPunct="1">
-              <a:lnSpc>
-                <a:spcPct val="100000"/>
-              </a:lnSpc>
-              <a:spcBef>
-                <a:spcPts val="0"/>
-              </a:spcBef>
-              <a:spcAft>
-                <a:spcPts val="0"/>
-              </a:spcAft>
-              <a:buClrTx/>
-              <a:buSzTx/>
-              <a:buFontTx/>
-              <a:buNone/>
-              <a:tabLst/>
-              <a:defRPr/>
-            </a:pPr>
+            <a:r>
+              <a:rPr lang="en-US" dirty="0"/>
+              <a:t>What do these variables mean?</a:t>
+            </a:r>
+          </a:p>
+          <a:p>
+            <a:r>
+              <a:rPr lang="en-US" dirty="0"/>
+              <a:t>Better names would give the reader a clue</a:t>
+            </a:r>
+          </a:p>
+          <a:p>
+            <a:r>
+              <a:rPr lang="en-US" dirty="0"/>
+              <a:t>&lt;click&gt;</a:t>
+            </a:r>
+          </a:p>
+          <a:p>
+            <a:r>
+              <a:rPr lang="en-US" dirty="0"/>
+              <a:t>This is a little better.  But does </a:t>
+            </a:r>
             <a:r>
               <a:rPr lang="en-US" dirty="0">
                 <a:solidFill>
                   <a:schemeClr val="tx1"/>
                 </a:solidFill>
               </a:rPr>
-              <a:t>In the real world, your workplace should have coding standards for things like this</a:t>
-            </a:r>
-          </a:p>
-          <a:p>
-            <a:pPr marL="0" marR="0" lvl="0" indent="0" algn="l" defTabSz="914400" rtl="0" eaLnBrk="1" fontAlgn="auto" latinLnBrk="0" hangingPunct="1">
-              <a:lnSpc>
-                <a:spcPct val="100000"/>
-              </a:lnSpc>
-              <a:spcBef>
-                <a:spcPts val="0"/>
-              </a:spcBef>
-              <a:spcAft>
-                <a:spcPts val="0"/>
-              </a:spcAft>
-              <a:buClrTx/>
-              <a:buSzTx/>
-              <a:buFontTx/>
-              <a:buNone/>
-              <a:tabLst/>
-              <a:defRPr/>
-            </a:pPr>
-            <a:endParaRPr lang="en-US" dirty="0">
-              <a:solidFill>
-                <a:schemeClr val="tx1"/>
-              </a:solidFill>
-            </a:endParaRPr>
-          </a:p>
-          <a:p>
-            <a:pPr marL="0" marR="0" lvl="0" indent="0" algn="l" defTabSz="914400" rtl="0" eaLnBrk="1" fontAlgn="auto" latinLnBrk="0" hangingPunct="1">
-              <a:lnSpc>
-                <a:spcPct val="100000"/>
-              </a:lnSpc>
-              <a:spcBef>
-                <a:spcPts val="0"/>
-              </a:spcBef>
-              <a:spcAft>
-                <a:spcPts val="0"/>
-              </a:spcAft>
-              <a:buClrTx/>
-              <a:buSzTx/>
-              <a:buFontTx/>
-              <a:buNone/>
-              <a:tabLst/>
-              <a:defRPr/>
-            </a:pPr>
+              <a:t>'temp' mean 'temporary', or 'temperature', or something else?</a:t>
+            </a:r>
+          </a:p>
+          <a:p>
             <a:r>
               <a:rPr lang="en-US" dirty="0">
                 <a:solidFill>
                   <a:schemeClr val="tx1"/>
                 </a:solidFill>
               </a:rPr>
-              <a:t>This particular convention is part of Prof. Wand's personal coding practice. .  You’ll see similar conventions in the names we chose for the functions in Homework 1.</a:t>
-            </a:r>
-          </a:p>
-          <a:p>
-            <a:pPr marL="0" marR="0" lvl="0" indent="0" algn="l" defTabSz="914400" rtl="0" eaLnBrk="1" fontAlgn="auto" latinLnBrk="0" hangingPunct="1">
-              <a:lnSpc>
-                <a:spcPct val="100000"/>
-              </a:lnSpc>
-              <a:spcBef>
-                <a:spcPts val="0"/>
-              </a:spcBef>
-              <a:spcAft>
-                <a:spcPts val="0"/>
-              </a:spcAft>
-              <a:buClrTx/>
-              <a:buSzTx/>
-              <a:buFontTx/>
-              <a:buNone/>
-              <a:tabLst/>
-              <a:defRPr/>
-            </a:pPr>
-            <a:endParaRPr lang="en-US" dirty="0">
-              <a:solidFill>
-                <a:schemeClr val="tx1"/>
-              </a:solidFill>
-            </a:endParaRPr>
-          </a:p>
-          <a:p>
-            <a:pPr marL="0" marR="0" lvl="0" indent="0" algn="l" defTabSz="914400" rtl="0" eaLnBrk="1" fontAlgn="auto" latinLnBrk="0" hangingPunct="1">
-              <a:lnSpc>
-                <a:spcPct val="100000"/>
-              </a:lnSpc>
-              <a:spcBef>
-                <a:spcPts val="0"/>
-              </a:spcBef>
-              <a:spcAft>
-                <a:spcPts val="0"/>
-              </a:spcAft>
-              <a:buClrTx/>
-              <a:buSzTx/>
-              <a:buFontTx/>
-              <a:buNone/>
-              <a:tabLst/>
-              <a:defRPr/>
-            </a:pPr>
+              <a:t>&lt;click&gt;</a:t>
+            </a:r>
+          </a:p>
+          <a:p>
             <a:r>
               <a:rPr lang="en-US" dirty="0">
                 <a:solidFill>
                   <a:schemeClr val="tx1"/>
                 </a:solidFill>
               </a:rPr>
-              <a:t>When you work on your team project, you may want to decide about the coding conventions you will use.</a:t>
-            </a:r>
-          </a:p>
-          <a:p>
+              <a:t>Better names for the data types would be even better.  We’ll say more about this in a minute, when we get to Principle 2: Make Your Data Mean Something</a:t>
+            </a:r>
             <a:endParaRPr lang="en-US" dirty="0"/>
-          </a:p>
-        </p:txBody>
-      </p:sp>
-      <p:sp>
-        <p:nvSpPr>
-          <p:cNvPr id="4" name="Slide Number Placeholder 3"/>
-          <p:cNvSpPr>
-            <a:spLocks noGrp="1"/>
-          </p:cNvSpPr>
-          <p:nvPr>
-            <p:ph type="sldNum" sz="quarter" idx="5"/>
-          </p:nvPr>
-        </p:nvSpPr>
-        <p:spPr/>
-        <p:txBody>
-          <a:bodyPr/>
-          <a:lstStyle/>
-          <a:p>
-            <a:fld id="{07937F07-1250-4CCE-B198-1B2887014F41}" type="slidenum">
-              <a:rPr lang="en-US" smtClean="0"/>
-              <a:t>12</a:t>
-            </a:fld>
-            <a:endParaRPr lang="en-US"/>
           </a:p>
         </p:txBody>
       </p:sp>
     </p:spTree>
     <p:extLst>
       <p:ext uri="{BB962C8B-B14F-4D97-AF65-F5344CB8AC3E}">
-        <p14:creationId xmlns:p14="http://schemas.microsoft.com/office/powerpoint/2010/main" val="3430801820"/>
+        <p14:creationId xmlns:p14="http://schemas.microsoft.com/office/powerpoint/2010/main" val="3017960103"/>
       </p:ext>
     </p:extLst>
   </p:cSld>
@@ -7921,7 +8184,7 @@
           <a:p>
             <a:fld id="{5D2A64DE-480B-420F-9649-4F8E696E08E0}" type="datetime1">
               <a:rPr lang="en-US" smtClean="0"/>
-              <a:t>9/14/2022</a:t>
+              <a:t>9/15/2022</a:t>
             </a:fld>
             <a:endParaRPr lang="en-US"/>
           </a:p>
@@ -8155,7 +8418,7 @@
           <a:p>
             <a:fld id="{0D3616D0-8311-4107-9726-6B805E7D05BA}" type="datetime1">
               <a:rPr lang="en-US" smtClean="0"/>
-              <a:t>9/14/2022</a:t>
+              <a:t>9/15/2022</a:t>
             </a:fld>
             <a:endParaRPr lang="en-US"/>
           </a:p>
@@ -8363,7 +8626,7 @@
           <a:p>
             <a:fld id="{3BC2557A-5C88-417A-A763-5AC779462A5F}" type="datetime1">
               <a:rPr lang="en-US" smtClean="0"/>
-              <a:t>9/14/2022</a:t>
+              <a:t>9/15/2022</a:t>
             </a:fld>
             <a:endParaRPr lang="en-US"/>
           </a:p>
@@ -8887,7 +9150,7 @@
           <a:p>
             <a:fld id="{07C7BFD4-467E-4EDE-93EA-052F5B39A4E5}" type="datetime1">
               <a:rPr lang="en-US" smtClean="0"/>
-              <a:t>9/14/2022</a:t>
+              <a:t>9/15/2022</a:t>
             </a:fld>
             <a:endParaRPr lang="en-US"/>
           </a:p>
@@ -9200,7 +9463,7 @@
           <a:p>
             <a:fld id="{A533CBE2-D5BE-47AC-ADC2-9CDFC1D0CF90}" type="datetime1">
               <a:rPr lang="en-US" smtClean="0"/>
-              <a:t>9/14/2022</a:t>
+              <a:t>9/15/2022</a:t>
             </a:fld>
             <a:endParaRPr lang="en-US"/>
           </a:p>
@@ -9501,7 +9764,7 @@
           <a:p>
             <a:fld id="{39B7EDB1-CE74-4951-85A2-0B01C2128E28}" type="datetime1">
               <a:rPr lang="en-US" smtClean="0"/>
-              <a:t>9/14/2022</a:t>
+              <a:t>9/15/2022</a:t>
             </a:fld>
             <a:endParaRPr lang="en-US"/>
           </a:p>
@@ -9949,7 +10212,7 @@
           <a:p>
             <a:fld id="{2BC7EB92-A5C2-4807-A9DC-9EDE6CBFB241}" type="datetime1">
               <a:rPr lang="en-US" smtClean="0"/>
-              <a:t>9/14/2022</a:t>
+              <a:t>9/15/2022</a:t>
             </a:fld>
             <a:endParaRPr lang="en-US"/>
           </a:p>
@@ -10095,7 +10358,7 @@
           <a:p>
             <a:fld id="{109E55A0-C911-4F03-82FC-7E5926047D46}" type="datetime1">
               <a:rPr lang="en-US" smtClean="0"/>
-              <a:t>9/14/2022</a:t>
+              <a:t>9/15/2022</a:t>
             </a:fld>
             <a:endParaRPr lang="en-US"/>
           </a:p>
@@ -10244,7 +10507,7 @@
           <a:p>
             <a:fld id="{2B7B7EE0-7771-4CD5-9B2B-3550753A54A1}" type="datetime1">
               <a:rPr lang="en-US" smtClean="0"/>
-              <a:t>9/14/2022</a:t>
+              <a:t>9/15/2022</a:t>
             </a:fld>
             <a:endParaRPr lang="en-US"/>
           </a:p>
@@ -10555,7 +10818,7 @@
           <a:p>
             <a:fld id="{F8B318B3-0E87-4416-A9B8-D891968C2727}" type="datetime1">
               <a:rPr lang="en-US" smtClean="0"/>
-              <a:t>9/14/2022</a:t>
+              <a:t>9/15/2022</a:t>
             </a:fld>
             <a:endParaRPr lang="en-US"/>
           </a:p>
@@ -10843,7 +11106,7 @@
           <a:p>
             <a:fld id="{EA476A42-A091-4468-A075-64A31BE59948}" type="datetime1">
               <a:rPr lang="en-US" smtClean="0"/>
-              <a:t>9/14/2022</a:t>
+              <a:t>9/15/2022</a:t>
             </a:fld>
             <a:endParaRPr lang="en-US"/>
           </a:p>
@@ -11084,7 +11347,7 @@
           <a:p>
             <a:fld id="{54D997E8-DDEE-43F1-8D9B-F8A1E11DE488}" type="datetime1">
               <a:rPr lang="en-US" smtClean="0"/>
-              <a:t>9/14/2022</a:t>
+              <a:t>9/15/2022</a:t>
             </a:fld>
             <a:endParaRPr lang="en-US"/>
           </a:p>
@@ -24458,7 +24721,7 @@
         </p:xfrm>
         <a:graphic>
           <a:graphicData uri="http://schemas.openxmlformats.org/drawingml/2006/diagram">
-            <dgm:relIds xmlns:dgm="http://schemas.openxmlformats.org/drawingml/2006/diagram" xmlns:r="http://schemas.openxmlformats.org/officeDocument/2006/relationships" r:dm="rId2" r:lo="rId3" r:qs="rId4" r:cs="rId5"/>
+            <dgm:relIds xmlns:dgm="http://schemas.openxmlformats.org/drawingml/2006/diagram" xmlns:r="http://schemas.openxmlformats.org/officeDocument/2006/relationships" r:dm="rId3" r:lo="rId4" r:qs="rId5" r:cs="rId6"/>
           </a:graphicData>
         </a:graphic>
       </p:graphicFrame>

</xml_diff>